<commit_message>
Enhance DataBinder and ExpressionUpdater for improved context handling and indexing
- Refactored ApplyContextPath in DataBinder to include detailed logging and handle nested contexts more effectively.
- Introduced adjustments for context paths with index offsets to support deeper nesting.
- Updated EvaluateTemplate to allow graceful handling of missing values and improved error logging.
- Enhanced ResolveValue to check for original backups in dictionaries, ensuring correct value resolution.
- Added methods for extracting properties from deeply nested structures, improving performance with cached variables.
- Modified ExpressionUpdater to skip index adjustments for Items arrays, ensuring they remain 0-based.
- Implemented logic in SlidePlanGenerator to determine items per slide based on direct vs sub-collection references, enhancing slide generation accuracy.
</commit_message>
<xml_diff>
--- a/src/DocuChef.TestConsoleApp/files/deep/test-template.pptx
+++ b/src/DocuChef.TestConsoleApp/files/deep/test-template.pptx
@@ -324,13 +324,37 @@
 <file path=ppt/revisionInfo.xml><?xml version="1.0" encoding="utf-8"?>
 <p1510:revInfo xmlns:a="http://schemas.openxmlformats.org/drawingml/2006/main" xmlns:r="http://schemas.openxmlformats.org/officeDocument/2006/relationships" xmlns:p1510="http://schemas.microsoft.com/office/powerpoint/2015/10/main">
   <p1510:revLst>
-    <p1510:client id="{BA8B300D-6849-49E4-8705-AD28EEB116B7}" v="64" dt="2025-06-29T13:33:43.994"/>
+    <p1510:client id="{BA8B300D-6849-49E4-8705-AD28EEB116B7}" v="71" dt="2025-06-29T17:54:30.281"/>
   </p1510:revLst>
 </p1510:revInfo>
 </file>
 
 <file path=ppt/changesInfos/changesInfo1.xml><?xml version="1.0" encoding="utf-8"?>
 <pc:chgInfo xmlns:a="http://schemas.openxmlformats.org/drawingml/2006/main" xmlns:r="http://schemas.openxmlformats.org/officeDocument/2006/relationships" xmlns:ac="http://schemas.microsoft.com/office/drawing/2013/main/command" xmlns:pc="http://schemas.microsoft.com/office/powerpoint/2013/main/command">
+  <pc:docChgLst>
+    <pc:chgData name="정언종" userId="899f684f-54d4-4d98-b09f-4a5a2cd83b3f" providerId="ADAL" clId="{7184E60B-E66C-45CE-97CB-E4BD1290C952}"/>
+    <pc:docChg chg="undo custSel modSld">
+      <pc:chgData name="정언종" userId="899f684f-54d4-4d98-b09f-4a5a2cd83b3f" providerId="ADAL" clId="{7184E60B-E66C-45CE-97CB-E4BD1290C952}" dt="2025-05-21T00:18:03.338" v="20" actId="20577"/>
+      <pc:docMkLst>
+        <pc:docMk/>
+      </pc:docMkLst>
+      <pc:sldChg chg="modSp mod">
+        <pc:chgData name="정언종" userId="899f684f-54d4-4d98-b09f-4a5a2cd83b3f" providerId="ADAL" clId="{7184E60B-E66C-45CE-97CB-E4BD1290C952}" dt="2025-05-21T00:18:03.338" v="20" actId="20577"/>
+        <pc:sldMkLst>
+          <pc:docMk/>
+          <pc:sldMk cId="0" sldId="256"/>
+        </pc:sldMkLst>
+        <pc:spChg chg="mod">
+          <ac:chgData name="정언종" userId="899f684f-54d4-4d98-b09f-4a5a2cd83b3f" providerId="ADAL" clId="{7184E60B-E66C-45CE-97CB-E4BD1290C952}" dt="2025-05-21T00:18:03.338" v="20" actId="20577"/>
+          <ac:spMkLst>
+            <pc:docMk/>
+            <pc:sldMk cId="0" sldId="256"/>
+            <ac:spMk id="258" creationId="{00000000-0000-0000-0000-000000000000}"/>
+          </ac:spMkLst>
+        </pc:spChg>
+      </pc:sldChg>
+    </pc:docChg>
+  </pc:docChgLst>
   <pc:docChgLst>
     <pc:chgData name="정언종" userId="899f684f-54d4-4d98-b09f-4a5a2cd83b3f" providerId="ADAL" clId="{41966FDA-CC0A-48BC-AD7C-5EA5064770D1}"/>
     <pc:docChg chg="undo redo custSel delSld modSld">
@@ -406,14 +430,38 @@
     </pc:docChg>
   </pc:docChgLst>
   <pc:docChgLst>
+    <pc:chgData name="정언종" userId="899f684f-54d4-4d98-b09f-4a5a2cd83b3f" providerId="ADAL" clId="{9F6818D8-6426-4543-95E5-5F8B3955A444}"/>
+    <pc:docChg chg="modSld">
+      <pc:chgData name="정언종" userId="899f684f-54d4-4d98-b09f-4a5a2cd83b3f" providerId="ADAL" clId="{9F6818D8-6426-4543-95E5-5F8B3955A444}" dt="2025-06-25T23:35:43.121" v="0"/>
+      <pc:docMkLst>
+        <pc:docMk/>
+      </pc:docMkLst>
+      <pc:sldChg chg="modSp">
+        <pc:chgData name="정언종" userId="899f684f-54d4-4d98-b09f-4a5a2cd83b3f" providerId="ADAL" clId="{9F6818D8-6426-4543-95E5-5F8B3955A444}" dt="2025-06-25T23:35:43.121" v="0"/>
+        <pc:sldMkLst>
+          <pc:docMk/>
+          <pc:sldMk cId="0" sldId="258"/>
+        </pc:sldMkLst>
+        <pc:spChg chg="mod">
+          <ac:chgData name="정언종" userId="899f684f-54d4-4d98-b09f-4a5a2cd83b3f" providerId="ADAL" clId="{9F6818D8-6426-4543-95E5-5F8B3955A444}" dt="2025-06-25T23:35:43.121" v="0"/>
+          <ac:spMkLst>
+            <pc:docMk/>
+            <pc:sldMk cId="0" sldId="258"/>
+            <ac:spMk id="7" creationId="{0E1C9C90-B828-9141-CD35-641F100760D2}"/>
+          </ac:spMkLst>
+        </pc:spChg>
+      </pc:sldChg>
+    </pc:docChg>
+  </pc:docChgLst>
+  <pc:docChgLst>
     <pc:chgData name="정언종" userId="899f684f-54d4-4d98-b09f-4a5a2cd83b3f" providerId="ADAL" clId="{BA8B300D-6849-49E4-8705-AD28EEB116B7}"/>
     <pc:docChg chg="undo custSel modSld">
-      <pc:chgData name="정언종" userId="899f684f-54d4-4d98-b09f-4a5a2cd83b3f" providerId="ADAL" clId="{BA8B300D-6849-49E4-8705-AD28EEB116B7}" dt="2025-06-29T13:33:43.994" v="249"/>
+      <pc:chgData name="정언종" userId="899f684f-54d4-4d98-b09f-4a5a2cd83b3f" providerId="ADAL" clId="{BA8B300D-6849-49E4-8705-AD28EEB116B7}" dt="2025-06-29T17:54:43.481" v="269" actId="20577"/>
       <pc:docMkLst>
         <pc:docMk/>
       </pc:docMkLst>
       <pc:sldChg chg="addSp delSp modSp mod modNotesTx">
-        <pc:chgData name="정언종" userId="899f684f-54d4-4d98-b09f-4a5a2cd83b3f" providerId="ADAL" clId="{BA8B300D-6849-49E4-8705-AD28EEB116B7}" dt="2025-06-29T13:33:43.994" v="249"/>
+        <pc:chgData name="정언종" userId="899f684f-54d4-4d98-b09f-4a5a2cd83b3f" providerId="ADAL" clId="{BA8B300D-6849-49E4-8705-AD28EEB116B7}" dt="2025-06-29T17:54:43.481" v="269" actId="20577"/>
         <pc:sldMkLst>
           <pc:docMk/>
           <pc:sldMk cId="0" sldId="258"/>
@@ -427,7 +475,7 @@
           </ac:spMkLst>
         </pc:spChg>
         <pc:spChg chg="add mod">
-          <ac:chgData name="정언종" userId="899f684f-54d4-4d98-b09f-4a5a2cd83b3f" providerId="ADAL" clId="{BA8B300D-6849-49E4-8705-AD28EEB116B7}" dt="2025-06-29T13:33:43.994" v="249"/>
+          <ac:chgData name="정언종" userId="899f684f-54d4-4d98-b09f-4a5a2cd83b3f" providerId="ADAL" clId="{BA8B300D-6849-49E4-8705-AD28EEB116B7}" dt="2025-06-29T17:54:43.481" v="269" actId="20577"/>
           <ac:spMkLst>
             <pc:docMk/>
             <pc:sldMk cId="0" sldId="258"/>
@@ -443,7 +491,7 @@
           </ac:spMkLst>
         </pc:spChg>
         <pc:spChg chg="mod">
-          <ac:chgData name="정언종" userId="899f684f-54d4-4d98-b09f-4a5a2cd83b3f" providerId="ADAL" clId="{BA8B300D-6849-49E4-8705-AD28EEB116B7}" dt="2025-06-29T13:33:39.826" v="246"/>
+          <ac:chgData name="정언종" userId="899f684f-54d4-4d98-b09f-4a5a2cd83b3f" providerId="ADAL" clId="{BA8B300D-6849-49E4-8705-AD28EEB116B7}" dt="2025-06-29T17:54:12.904" v="250" actId="2711"/>
           <ac:spMkLst>
             <pc:docMk/>
             <pc:sldMk cId="0" sldId="258"/>
@@ -528,54 +576,6 @@
             <pc:docMk/>
             <pc:sldMk cId="0" sldId="258"/>
             <ac:spMk id="125" creationId="{162FDB92-3C12-8C53-6966-84B980DD363B}"/>
-          </ac:spMkLst>
-        </pc:spChg>
-      </pc:sldChg>
-    </pc:docChg>
-  </pc:docChgLst>
-  <pc:docChgLst>
-    <pc:chgData name="정언종" userId="899f684f-54d4-4d98-b09f-4a5a2cd83b3f" providerId="ADAL" clId="{9F6818D8-6426-4543-95E5-5F8B3955A444}"/>
-    <pc:docChg chg="modSld">
-      <pc:chgData name="정언종" userId="899f684f-54d4-4d98-b09f-4a5a2cd83b3f" providerId="ADAL" clId="{9F6818D8-6426-4543-95E5-5F8B3955A444}" dt="2025-06-25T23:35:43.121" v="0"/>
-      <pc:docMkLst>
-        <pc:docMk/>
-      </pc:docMkLst>
-      <pc:sldChg chg="modSp">
-        <pc:chgData name="정언종" userId="899f684f-54d4-4d98-b09f-4a5a2cd83b3f" providerId="ADAL" clId="{9F6818D8-6426-4543-95E5-5F8B3955A444}" dt="2025-06-25T23:35:43.121" v="0"/>
-        <pc:sldMkLst>
-          <pc:docMk/>
-          <pc:sldMk cId="0" sldId="258"/>
-        </pc:sldMkLst>
-        <pc:spChg chg="mod">
-          <ac:chgData name="정언종" userId="899f684f-54d4-4d98-b09f-4a5a2cd83b3f" providerId="ADAL" clId="{9F6818D8-6426-4543-95E5-5F8B3955A444}" dt="2025-06-25T23:35:43.121" v="0"/>
-          <ac:spMkLst>
-            <pc:docMk/>
-            <pc:sldMk cId="0" sldId="258"/>
-            <ac:spMk id="7" creationId="{0E1C9C90-B828-9141-CD35-641F100760D2}"/>
-          </ac:spMkLst>
-        </pc:spChg>
-      </pc:sldChg>
-    </pc:docChg>
-  </pc:docChgLst>
-  <pc:docChgLst>
-    <pc:chgData name="정언종" userId="899f684f-54d4-4d98-b09f-4a5a2cd83b3f" providerId="ADAL" clId="{7184E60B-E66C-45CE-97CB-E4BD1290C952}"/>
-    <pc:docChg chg="undo custSel modSld">
-      <pc:chgData name="정언종" userId="899f684f-54d4-4d98-b09f-4a5a2cd83b3f" providerId="ADAL" clId="{7184E60B-E66C-45CE-97CB-E4BD1290C952}" dt="2025-05-21T00:18:03.338" v="20" actId="20577"/>
-      <pc:docMkLst>
-        <pc:docMk/>
-      </pc:docMkLst>
-      <pc:sldChg chg="modSp mod">
-        <pc:chgData name="정언종" userId="899f684f-54d4-4d98-b09f-4a5a2cd83b3f" providerId="ADAL" clId="{7184E60B-E66C-45CE-97CB-E4BD1290C952}" dt="2025-05-21T00:18:03.338" v="20" actId="20577"/>
-        <pc:sldMkLst>
-          <pc:docMk/>
-          <pc:sldMk cId="0" sldId="256"/>
-        </pc:sldMkLst>
-        <pc:spChg chg="mod">
-          <ac:chgData name="정언종" userId="899f684f-54d4-4d98-b09f-4a5a2cd83b3f" providerId="ADAL" clId="{7184E60B-E66C-45CE-97CB-E4BD1290C952}" dt="2025-05-21T00:18:03.338" v="20" actId="20577"/>
-          <ac:spMkLst>
-            <pc:docMk/>
-            <pc:sldMk cId="0" sldId="256"/>
-            <ac:spMk id="258" creationId="{00000000-0000-0000-0000-000000000000}"/>
           </ac:spMkLst>
         </pc:spChg>
       </pc:sldChg>
@@ -3775,7 +3775,7 @@
           <a:p>
             <a:fld id="{1D8BD707-D9CF-40AE-B4C6-C98DA3205C09}" type="datetimeFigureOut">
               <a:rPr lang="en-US"/>
-              <a:t>6/29/2025</a:t>
+              <a:t>6/30/2025</a:t>
             </a:fld>
             <a:endParaRPr lang="en-US"/>
           </a:p>
@@ -6154,22 +6154,12 @@
           <a:p>
             <a:r>
               <a:rPr lang="en-US" altLang="ko-KR">
-                <a:latin typeface="LINE Seed Sans KR Bold"/>
+                <a:latin typeface="맑은 고딕 (제목)"/>
               </a:rPr>
-              <a:t>${</a:t>
-            </a:r>
-            <a:r>
-              <a:rPr lang="en-US" altLang="ko-KR"/>
-              <a:t>Brands&gt;</a:t>
-            </a:r>
-            <a:r>
-              <a:rPr lang="en-US" altLang="ko-KR">
-                <a:latin typeface="LINE Seed Sans KR Bold"/>
-              </a:rPr>
-              <a:t>Types[0].Key}</a:t>
+              <a:t>${Brands&gt;Types[0].Key}</a:t>
             </a:r>
             <a:endParaRPr lang="ko-KR" altLang="en-US" dirty="0">
-              <a:latin typeface="LINE Seed Sans KR Bold"/>
+              <a:latin typeface="맑은 고딕 (제목)"/>
             </a:endParaRPr>
           </a:p>
         </p:txBody>
@@ -6188,8 +6178,8 @@
         </p:nvSpPr>
         <p:spPr>
           <a:xfrm>
-            <a:off x="2585145" y="1541458"/>
-            <a:ext cx="6494251" cy="1200329"/>
+            <a:off x="2513259" y="1541458"/>
+            <a:ext cx="6494251" cy="369332"/>
           </a:xfrm>
           <a:prstGeom prst="rect">
             <a:avLst/>
@@ -6222,199 +6212,228 @@
           <a:p>
             <a:r>
               <a:rPr lang="en-US" altLang="ko-KR">
-                <a:latin typeface="LINE Seed Sans KR Bold"/>
+                <a:latin typeface="맑은 고딕 (제목)"/>
               </a:rPr>
-              <a:t>${</a:t>
-            </a:r>
-            <a:r>
-              <a:rPr lang="en-US" altLang="ko-KR"/>
-              <a:t>Brands&gt;</a:t>
-            </a:r>
-            <a:r>
-              <a:rPr lang="en-US" altLang="ko-KR">
-                <a:latin typeface="LINE Seed Sans KR Bold"/>
-              </a:rPr>
-              <a:t>Types</a:t>
-            </a:r>
-            <a:r>
-              <a:rPr lang="en-US" altLang="ko-KR"/>
-              <a:t>&gt;Items[0]</a:t>
-            </a:r>
-            <a:r>
-              <a:rPr lang="en-US" altLang="ko-KR">
-                <a:latin typeface="LINE Seed Sans KR Bold"/>
-              </a:rPr>
-              <a:t>["Item_</a:t>
+              <a:t>${Brands&gt;Types&gt;Items[0]["Item_</a:t>
             </a:r>
             <a:r>
               <a:rPr lang="ko-KR" altLang="en-US">
-                <a:latin typeface="LINE Seed Sans KR Bold"/>
+                <a:latin typeface="맑은 고딕 (제목)"/>
               </a:rPr>
               <a:t>캐릭터</a:t>
             </a:r>
             <a:r>
               <a:rPr lang="en-US" altLang="ko-KR">
-                <a:latin typeface="LINE Seed Sans KR Bold"/>
+                <a:latin typeface="맑은 고딕 (제목)"/>
               </a:rPr>
               <a:t>_</a:t>
             </a:r>
             <a:r>
               <a:rPr lang="ko-KR" altLang="en-US">
-                <a:latin typeface="LINE Seed Sans KR Bold"/>
+                <a:latin typeface="맑은 고딕 (제목)"/>
               </a:rPr>
               <a:t>세분류</a:t>
             </a:r>
             <a:r>
               <a:rPr lang="en-US" altLang="ko-KR">
-                <a:latin typeface="LINE Seed Sans KR Bold"/>
+                <a:latin typeface="맑은 고딕 (제목)"/>
               </a:rPr>
               <a:t>_</a:t>
             </a:r>
             <a:r>
               <a:rPr lang="ko-KR" altLang="en-US">
-                <a:latin typeface="LINE Seed Sans KR Bold"/>
+                <a:latin typeface="맑은 고딕 (제목)"/>
               </a:rPr>
               <a:t>명</a:t>
             </a:r>
             <a:r>
               <a:rPr lang="en-US" altLang="ko-KR">
-                <a:latin typeface="LINE Seed Sans KR Bold"/>
+                <a:latin typeface="맑은 고딕 (제목)"/>
               </a:rPr>
               <a:t>"]}</a:t>
             </a:r>
           </a:p>
+        </p:txBody>
+      </p:sp>
+      <p:sp>
+        <p:nvSpPr>
+          <p:cNvPr id="3" name="TextBox 2">
+            <a:extLst>
+              <a:ext uri="{FF2B5EF4-FFF2-40B4-BE49-F238E27FC236}">
+                <a16:creationId xmlns:a16="http://schemas.microsoft.com/office/drawing/2014/main" id="{29E202B0-18A5-BE69-692E-8E4B1BCDBCDF}"/>
+              </a:ext>
+            </a:extLst>
+          </p:cNvPr>
+          <p:cNvSpPr txBox="1"/>
+          <p:nvPr/>
+        </p:nvSpPr>
+        <p:spPr>
+          <a:xfrm>
+            <a:off x="2513259" y="1903429"/>
+            <a:ext cx="6494251" cy="369332"/>
+          </a:xfrm>
+          <a:prstGeom prst="rect">
+            <a:avLst/>
+          </a:prstGeom>
+          <a:noFill/>
+          <a:ln w="12700" cap="flat">
+            <a:noFill/>
+            <a:miter lim="400000"/>
+          </a:ln>
+          <a:effectLst/>
+          <a:sp3d/>
+        </p:spPr>
+        <p:style>
+          <a:lnRef idx="0">
+            <a:scrgbClr r="0" g="0" b="0"/>
+          </a:lnRef>
+          <a:fillRef idx="0">
+            <a:scrgbClr r="0" g="0" b="0"/>
+          </a:fillRef>
+          <a:effectRef idx="0">
+            <a:scrgbClr r="0" g="0" b="0"/>
+          </a:effectRef>
+          <a:fontRef idx="none"/>
+        </p:style>
+        <p:txBody>
+          <a:bodyPr wrap="square">
+            <a:spAutoFit/>
+          </a:bodyPr>
+          <a:lstStyle/>
           <a:p>
             <a:r>
               <a:rPr lang="en-US" altLang="ko-KR">
-                <a:latin typeface="LINE Seed Sans KR Bold"/>
+                <a:latin typeface="맑은 고딕 (제목)"/>
               </a:rPr>
-              <a:t>${</a:t>
-            </a:r>
-            <a:r>
-              <a:rPr lang="en-US" altLang="ko-KR"/>
-              <a:t>Brands&gt;</a:t>
-            </a:r>
-            <a:r>
-              <a:rPr lang="en-US" altLang="ko-KR">
-                <a:latin typeface="LINE Seed Sans KR Bold"/>
-              </a:rPr>
-              <a:t>Types</a:t>
-            </a:r>
-            <a:r>
-              <a:rPr lang="en-US" altLang="ko-KR"/>
-              <a:t>&gt;Items[1]</a:t>
-            </a:r>
-            <a:r>
-              <a:rPr lang="en-US" altLang="ko-KR">
-                <a:latin typeface="LINE Seed Sans KR Bold"/>
-              </a:rPr>
-              <a:t>["Item_</a:t>
+              <a:t>${Brands&gt;Types&gt;Items[1]["Item_</a:t>
             </a:r>
             <a:r>
               <a:rPr lang="ko-KR" altLang="en-US">
-                <a:latin typeface="LINE Seed Sans KR Bold"/>
+                <a:latin typeface="맑은 고딕 (제목)"/>
               </a:rPr>
               <a:t>캐릭터</a:t>
             </a:r>
             <a:r>
               <a:rPr lang="en-US" altLang="ko-KR">
-                <a:latin typeface="LINE Seed Sans KR Bold"/>
+                <a:latin typeface="맑은 고딕 (제목)"/>
               </a:rPr>
               <a:t>_</a:t>
             </a:r>
             <a:r>
               <a:rPr lang="ko-KR" altLang="en-US">
-                <a:latin typeface="LINE Seed Sans KR Bold"/>
+                <a:latin typeface="맑은 고딕 (제목)"/>
               </a:rPr>
               <a:t>세분류</a:t>
             </a:r>
             <a:r>
               <a:rPr lang="en-US" altLang="ko-KR">
-                <a:latin typeface="LINE Seed Sans KR Bold"/>
+                <a:latin typeface="맑은 고딕 (제목)"/>
               </a:rPr>
               <a:t>_</a:t>
             </a:r>
             <a:r>
               <a:rPr lang="ko-KR" altLang="en-US">
-                <a:latin typeface="LINE Seed Sans KR Bold"/>
+                <a:latin typeface="맑은 고딕 (제목)"/>
               </a:rPr>
               <a:t>명</a:t>
             </a:r>
             <a:r>
               <a:rPr lang="en-US" altLang="ko-KR">
-                <a:latin typeface="LINE Seed Sans KR Bold"/>
+                <a:latin typeface="맑은 고딕 (제목)"/>
               </a:rPr>
               <a:t>"]}</a:t>
             </a:r>
           </a:p>
+        </p:txBody>
+      </p:sp>
+      <p:sp>
+        <p:nvSpPr>
+          <p:cNvPr id="4" name="TextBox 3">
+            <a:extLst>
+              <a:ext uri="{FF2B5EF4-FFF2-40B4-BE49-F238E27FC236}">
+                <a16:creationId xmlns:a16="http://schemas.microsoft.com/office/drawing/2014/main" id="{1AC8144E-D331-60AF-2124-425093553F42}"/>
+              </a:ext>
+            </a:extLst>
+          </p:cNvPr>
+          <p:cNvSpPr txBox="1"/>
+          <p:nvPr/>
+        </p:nvSpPr>
+        <p:spPr>
+          <a:xfrm>
+            <a:off x="2513259" y="2265400"/>
+            <a:ext cx="6494251" cy="369332"/>
+          </a:xfrm>
+          <a:prstGeom prst="rect">
+            <a:avLst/>
+          </a:prstGeom>
+          <a:noFill/>
+          <a:ln w="12700" cap="flat">
+            <a:noFill/>
+            <a:miter lim="400000"/>
+          </a:ln>
+          <a:effectLst/>
+          <a:sp3d/>
+        </p:spPr>
+        <p:style>
+          <a:lnRef idx="0">
+            <a:scrgbClr r="0" g="0" b="0"/>
+          </a:lnRef>
+          <a:fillRef idx="0">
+            <a:scrgbClr r="0" g="0" b="0"/>
+          </a:fillRef>
+          <a:effectRef idx="0">
+            <a:scrgbClr r="0" g="0" b="0"/>
+          </a:effectRef>
+          <a:fontRef idx="none"/>
+        </p:style>
+        <p:txBody>
+          <a:bodyPr wrap="square">
+            <a:spAutoFit/>
+          </a:bodyPr>
+          <a:lstStyle/>
           <a:p>
             <a:r>
               <a:rPr lang="en-US" altLang="ko-KR">
-                <a:latin typeface="LINE Seed Sans KR Bold"/>
+                <a:latin typeface="맑은 고딕 (제목)"/>
               </a:rPr>
-              <a:t>${</a:t>
-            </a:r>
-            <a:r>
-              <a:rPr lang="en-US" altLang="ko-KR"/>
-              <a:t>Brands&gt;</a:t>
-            </a:r>
-            <a:r>
-              <a:rPr lang="en-US" altLang="ko-KR">
-                <a:latin typeface="LINE Seed Sans KR Bold"/>
-              </a:rPr>
-              <a:t>Types</a:t>
-            </a:r>
-            <a:r>
-              <a:rPr lang="en-US" altLang="ko-KR"/>
-              <a:t>&gt;Items[2]</a:t>
-            </a:r>
-            <a:r>
-              <a:rPr lang="en-US" altLang="ko-KR">
-                <a:latin typeface="LINE Seed Sans KR Bold"/>
-              </a:rPr>
-              <a:t>["Item_</a:t>
+              <a:t>${Brands&gt;Types&gt;Items[2]["Item_</a:t>
             </a:r>
             <a:r>
               <a:rPr lang="ko-KR" altLang="en-US">
-                <a:latin typeface="LINE Seed Sans KR Bold"/>
+                <a:latin typeface="맑은 고딕 (제목)"/>
               </a:rPr>
               <a:t>캐릭터</a:t>
             </a:r>
             <a:r>
               <a:rPr lang="en-US" altLang="ko-KR">
-                <a:latin typeface="LINE Seed Sans KR Bold"/>
+                <a:latin typeface="맑은 고딕 (제목)"/>
               </a:rPr>
               <a:t>_</a:t>
             </a:r>
             <a:r>
               <a:rPr lang="ko-KR" altLang="en-US">
-                <a:latin typeface="LINE Seed Sans KR Bold"/>
+                <a:latin typeface="맑은 고딕 (제목)"/>
               </a:rPr>
               <a:t>세분류</a:t>
             </a:r>
             <a:r>
               <a:rPr lang="en-US" altLang="ko-KR">
-                <a:latin typeface="LINE Seed Sans KR Bold"/>
+                <a:latin typeface="맑은 고딕 (제목)"/>
               </a:rPr>
               <a:t>_</a:t>
             </a:r>
             <a:r>
               <a:rPr lang="ko-KR" altLang="en-US">
-                <a:latin typeface="LINE Seed Sans KR Bold"/>
+                <a:latin typeface="맑은 고딕 (제목)"/>
               </a:rPr>
               <a:t>명</a:t>
             </a:r>
             <a:r>
               <a:rPr lang="en-US" altLang="ko-KR">
-                <a:latin typeface="LINE Seed Sans KR Bold"/>
+                <a:latin typeface="맑은 고딕 (제목)"/>
               </a:rPr>
               <a:t>"]}</a:t>
             </a:r>
-          </a:p>
-          <a:p>
-            <a:endParaRPr lang="en-US" altLang="ko-KR">
-              <a:latin typeface="LINE Seed Sans KR Bold"/>
-            </a:endParaRPr>
           </a:p>
         </p:txBody>
       </p:sp>
@@ -8724,6 +8743,17 @@
 </file>
 
 <file path=customXml/item1.xml><?xml version="1.0" encoding="utf-8"?>
+<p:properties xmlns:p="http://schemas.microsoft.com/office/2006/metadata/properties" xmlns:xsi="http://www.w3.org/2001/XMLSchema-instance" xmlns:pc="http://schemas.microsoft.com/office/infopath/2007/PartnerControls">
+  <documentManagement>
+    <TaxCatchAll xmlns="0ecacd0f-83e0-492f-bd4a-5a9e7a35ff9c" xsi:nil="true"/>
+    <lcf76f155ced4ddcb4097134ff3c332f xmlns="b9329f95-2df8-4c55-a92f-394dba339443">
+      <Terms xmlns="http://schemas.microsoft.com/office/infopath/2007/PartnerControls"/>
+    </lcf76f155ced4ddcb4097134ff3c332f>
+  </documentManagement>
+</p:properties>
+</file>
+
+<file path=customXml/item2.xml><?xml version="1.0" encoding="utf-8"?>
 <ct:contentTypeSchema xmlns:ct="http://schemas.microsoft.com/office/2006/metadata/contentType" xmlns:ma="http://schemas.microsoft.com/office/2006/metadata/properties/metaAttributes" ct:_="" ma:_="" ma:contentTypeName="문서" ma:contentTypeID="0x010100D5E592D9D81F394BACEE85FAD57B336A" ma:contentTypeVersion="16" ma:contentTypeDescription="새 문서를 만듭니다." ma:contentTypeScope="" ma:versionID="2a7db5fbf860aea804c81eb63271f2d5">
   <xsd:schema xmlns:xsd="http://www.w3.org/2001/XMLSchema" xmlns:xs="http://www.w3.org/2001/XMLSchema" xmlns:p="http://schemas.microsoft.com/office/2006/metadata/properties" xmlns:ns2="b9329f95-2df8-4c55-a92f-394dba339443" xmlns:ns3="0ecacd0f-83e0-492f-bd4a-5a9e7a35ff9c" targetNamespace="http://schemas.microsoft.com/office/2006/metadata/properties" ma:root="true" ma:fieldsID="ebbe6bc28d6f5af8ddd5b4e247879598" ns2:_="" ns3:_="">
     <xsd:import namespace="b9329f95-2df8-4c55-a92f-394dba339443"/>
@@ -8964,7 +8994,7 @@
 </ct:contentTypeSchema>
 </file>
 
-<file path=customXml/item2.xml><?xml version="1.0" encoding="utf-8"?>
+<file path=customXml/item3.xml><?xml version="1.0" encoding="utf-8"?>
 <?mso-contentType ?>
 <FormTemplates xmlns="http://schemas.microsoft.com/sharepoint/v3/contenttype/forms">
   <Display>DocumentLibraryForm</Display>
@@ -8973,18 +9003,18 @@
 </FormTemplates>
 </file>
 
-<file path=customXml/item3.xml><?xml version="1.0" encoding="utf-8"?>
-<p:properties xmlns:p="http://schemas.microsoft.com/office/2006/metadata/properties" xmlns:xsi="http://www.w3.org/2001/XMLSchema-instance" xmlns:pc="http://schemas.microsoft.com/office/infopath/2007/PartnerControls">
-  <documentManagement>
-    <TaxCatchAll xmlns="0ecacd0f-83e0-492f-bd4a-5a9e7a35ff9c" xsi:nil="true"/>
-    <lcf76f155ced4ddcb4097134ff3c332f xmlns="b9329f95-2df8-4c55-a92f-394dba339443">
-      <Terms xmlns="http://schemas.microsoft.com/office/infopath/2007/PartnerControls"/>
-    </lcf76f155ced4ddcb4097134ff3c332f>
-  </documentManagement>
-</p:properties>
+<file path=customXml/itemProps1.xml><?xml version="1.0" encoding="utf-8"?>
+<ds:datastoreItem xmlns:ds="http://schemas.openxmlformats.org/officeDocument/2006/customXml" ds:itemID="{6DF45D6B-9CD7-4CD6-93CC-F49636405F02}">
+  <ds:schemaRefs>
+    <ds:schemaRef ds:uri="http://schemas.microsoft.com/office/2006/metadata/properties"/>
+    <ds:schemaRef ds:uri="http://schemas.microsoft.com/office/infopath/2007/PartnerControls"/>
+    <ds:schemaRef ds:uri="0ecacd0f-83e0-492f-bd4a-5a9e7a35ff9c"/>
+    <ds:schemaRef ds:uri="b9329f95-2df8-4c55-a92f-394dba339443"/>
+  </ds:schemaRefs>
+</ds:datastoreItem>
 </file>
 
-<file path=customXml/itemProps1.xml><?xml version="1.0" encoding="utf-8"?>
+<file path=customXml/itemProps2.xml><?xml version="1.0" encoding="utf-8"?>
 <ds:datastoreItem xmlns:ds="http://schemas.openxmlformats.org/officeDocument/2006/customXml" ds:itemID="{4CB31A9A-D32A-4D8E-BD99-B568A7091B71}">
   <ds:schemaRefs>
     <ds:schemaRef ds:uri="http://schemas.microsoft.com/office/2006/metadata/contentType"/>
@@ -9003,21 +9033,10 @@
 </ds:datastoreItem>
 </file>
 
-<file path=customXml/itemProps2.xml><?xml version="1.0" encoding="utf-8"?>
+<file path=customXml/itemProps3.xml><?xml version="1.0" encoding="utf-8"?>
 <ds:datastoreItem xmlns:ds="http://schemas.openxmlformats.org/officeDocument/2006/customXml" ds:itemID="{BFDA123D-8DD5-4A37-8415-071CF94EC202}">
   <ds:schemaRefs>
     <ds:schemaRef ds:uri="http://schemas.microsoft.com/sharepoint/v3/contenttype/forms"/>
   </ds:schemaRefs>
 </ds:datastoreItem>
-</file>
-
-<file path=customXml/itemProps3.xml><?xml version="1.0" encoding="utf-8"?>
-<ds:datastoreItem xmlns:ds="http://schemas.openxmlformats.org/officeDocument/2006/customXml" ds:itemID="{6DF45D6B-9CD7-4CD6-93CC-F49636405F02}">
-  <ds:schemaRefs>
-    <ds:schemaRef ds:uri="http://schemas.microsoft.com/office/2006/metadata/properties"/>
-    <ds:schemaRef ds:uri="http://schemas.microsoft.com/office/infopath/2007/PartnerControls"/>
-    <ds:schemaRef ds:uri="0ecacd0f-83e0-492f-bd4a-5a9e7a35ff9c"/>
-    <ds:schemaRef ds:uri="b9329f95-2df8-4c55-a92f-394dba339443"/>
-  </ds:schemaRefs>
-</ds:datastoreItem>
 </file>
</xml_diff>

<commit_message>
Refactor and enhance PowerPoint processing features
- Updated `DeepTest` class to include new test templates and aliases.
- Commented out `DeepTest.Run()` in `Program.cs` and added `AliasTest.Run()`.
- Improved text processing in `ContextBasedPowerPointProcessor` to extract paragraphs and manage visibility.
- Enhanced `DataBinder` for better context path handling and removed outdated array validation methods.
- Added detailed logging in `ExpressionUpdater` for alias transformations.
- Modified `TemplateAnalyzer` to better handle concatenated directives in slide notes.
</commit_message>
<xml_diff>
--- a/src/DocuChef.TestConsoleApp/files/deep/test-template.pptx
+++ b/src/DocuChef.TestConsoleApp/files/deep/test-template.pptx
@@ -324,37 +324,13 @@
 <file path=ppt/revisionInfo.xml><?xml version="1.0" encoding="utf-8"?>
 <p1510:revInfo xmlns:a="http://schemas.openxmlformats.org/drawingml/2006/main" xmlns:r="http://schemas.openxmlformats.org/officeDocument/2006/relationships" xmlns:p1510="http://schemas.microsoft.com/office/powerpoint/2015/10/main">
   <p1510:revLst>
-    <p1510:client id="{BA8B300D-6849-49E4-8705-AD28EEB116B7}" v="71" dt="2025-06-29T17:54:30.281"/>
+    <p1510:client id="{BA8B300D-6849-49E4-8705-AD28EEB116B7}" v="87" dt="2025-06-30T05:27:40.163"/>
   </p1510:revLst>
 </p1510:revInfo>
 </file>
 
 <file path=ppt/changesInfos/changesInfo1.xml><?xml version="1.0" encoding="utf-8"?>
 <pc:chgInfo xmlns:a="http://schemas.openxmlformats.org/drawingml/2006/main" xmlns:r="http://schemas.openxmlformats.org/officeDocument/2006/relationships" xmlns:ac="http://schemas.microsoft.com/office/drawing/2013/main/command" xmlns:pc="http://schemas.microsoft.com/office/powerpoint/2013/main/command">
-  <pc:docChgLst>
-    <pc:chgData name="정언종" userId="899f684f-54d4-4d98-b09f-4a5a2cd83b3f" providerId="ADAL" clId="{7184E60B-E66C-45CE-97CB-E4BD1290C952}"/>
-    <pc:docChg chg="undo custSel modSld">
-      <pc:chgData name="정언종" userId="899f684f-54d4-4d98-b09f-4a5a2cd83b3f" providerId="ADAL" clId="{7184E60B-E66C-45CE-97CB-E4BD1290C952}" dt="2025-05-21T00:18:03.338" v="20" actId="20577"/>
-      <pc:docMkLst>
-        <pc:docMk/>
-      </pc:docMkLst>
-      <pc:sldChg chg="modSp mod">
-        <pc:chgData name="정언종" userId="899f684f-54d4-4d98-b09f-4a5a2cd83b3f" providerId="ADAL" clId="{7184E60B-E66C-45CE-97CB-E4BD1290C952}" dt="2025-05-21T00:18:03.338" v="20" actId="20577"/>
-        <pc:sldMkLst>
-          <pc:docMk/>
-          <pc:sldMk cId="0" sldId="256"/>
-        </pc:sldMkLst>
-        <pc:spChg chg="mod">
-          <ac:chgData name="정언종" userId="899f684f-54d4-4d98-b09f-4a5a2cd83b3f" providerId="ADAL" clId="{7184E60B-E66C-45CE-97CB-E4BD1290C952}" dt="2025-05-21T00:18:03.338" v="20" actId="20577"/>
-          <ac:spMkLst>
-            <pc:docMk/>
-            <pc:sldMk cId="0" sldId="256"/>
-            <ac:spMk id="258" creationId="{00000000-0000-0000-0000-000000000000}"/>
-          </ac:spMkLst>
-        </pc:spChg>
-      </pc:sldChg>
-    </pc:docChg>
-  </pc:docChgLst>
   <pc:docChgLst>
     <pc:chgData name="정언종" userId="899f684f-54d4-4d98-b09f-4a5a2cd83b3f" providerId="ADAL" clId="{41966FDA-CC0A-48BC-AD7C-5EA5064770D1}"/>
     <pc:docChg chg="undo redo custSel delSld modSld">
@@ -430,38 +406,14 @@
     </pc:docChg>
   </pc:docChgLst>
   <pc:docChgLst>
-    <pc:chgData name="정언종" userId="899f684f-54d4-4d98-b09f-4a5a2cd83b3f" providerId="ADAL" clId="{9F6818D8-6426-4543-95E5-5F8B3955A444}"/>
-    <pc:docChg chg="modSld">
-      <pc:chgData name="정언종" userId="899f684f-54d4-4d98-b09f-4a5a2cd83b3f" providerId="ADAL" clId="{9F6818D8-6426-4543-95E5-5F8B3955A444}" dt="2025-06-25T23:35:43.121" v="0"/>
-      <pc:docMkLst>
-        <pc:docMk/>
-      </pc:docMkLst>
-      <pc:sldChg chg="modSp">
-        <pc:chgData name="정언종" userId="899f684f-54d4-4d98-b09f-4a5a2cd83b3f" providerId="ADAL" clId="{9F6818D8-6426-4543-95E5-5F8B3955A444}" dt="2025-06-25T23:35:43.121" v="0"/>
-        <pc:sldMkLst>
-          <pc:docMk/>
-          <pc:sldMk cId="0" sldId="258"/>
-        </pc:sldMkLst>
-        <pc:spChg chg="mod">
-          <ac:chgData name="정언종" userId="899f684f-54d4-4d98-b09f-4a5a2cd83b3f" providerId="ADAL" clId="{9F6818D8-6426-4543-95E5-5F8B3955A444}" dt="2025-06-25T23:35:43.121" v="0"/>
-          <ac:spMkLst>
-            <pc:docMk/>
-            <pc:sldMk cId="0" sldId="258"/>
-            <ac:spMk id="7" creationId="{0E1C9C90-B828-9141-CD35-641F100760D2}"/>
-          </ac:spMkLst>
-        </pc:spChg>
-      </pc:sldChg>
-    </pc:docChg>
-  </pc:docChgLst>
-  <pc:docChgLst>
     <pc:chgData name="정언종" userId="899f684f-54d4-4d98-b09f-4a5a2cd83b3f" providerId="ADAL" clId="{BA8B300D-6849-49E4-8705-AD28EEB116B7}"/>
     <pc:docChg chg="undo custSel modSld">
-      <pc:chgData name="정언종" userId="899f684f-54d4-4d98-b09f-4a5a2cd83b3f" providerId="ADAL" clId="{BA8B300D-6849-49E4-8705-AD28EEB116B7}" dt="2025-06-29T17:54:43.481" v="269" actId="20577"/>
+      <pc:chgData name="정언종" userId="899f684f-54d4-4d98-b09f-4a5a2cd83b3f" providerId="ADAL" clId="{BA8B300D-6849-49E4-8705-AD28EEB116B7}" dt="2025-06-30T05:31:00.797" v="320" actId="478"/>
       <pc:docMkLst>
         <pc:docMk/>
       </pc:docMkLst>
       <pc:sldChg chg="addSp delSp modSp mod modNotesTx">
-        <pc:chgData name="정언종" userId="899f684f-54d4-4d98-b09f-4a5a2cd83b3f" providerId="ADAL" clId="{BA8B300D-6849-49E4-8705-AD28EEB116B7}" dt="2025-06-29T17:54:43.481" v="269" actId="20577"/>
+        <pc:chgData name="정언종" userId="899f684f-54d4-4d98-b09f-4a5a2cd83b3f" providerId="ADAL" clId="{BA8B300D-6849-49E4-8705-AD28EEB116B7}" dt="2025-06-30T05:31:00.797" v="320" actId="478"/>
         <pc:sldMkLst>
           <pc:docMk/>
           <pc:sldMk cId="0" sldId="258"/>
@@ -474,12 +426,84 @@
             <ac:spMk id="2" creationId="{7E94264A-B0B1-E60E-66C2-B69EF2FCAF67}"/>
           </ac:spMkLst>
         </pc:spChg>
-        <pc:spChg chg="add mod">
-          <ac:chgData name="정언종" userId="899f684f-54d4-4d98-b09f-4a5a2cd83b3f" providerId="ADAL" clId="{BA8B300D-6849-49E4-8705-AD28EEB116B7}" dt="2025-06-29T17:54:43.481" v="269" actId="20577"/>
+        <pc:spChg chg="add del mod">
+          <ac:chgData name="정언종" userId="899f684f-54d4-4d98-b09f-4a5a2cd83b3f" providerId="ADAL" clId="{BA8B300D-6849-49E4-8705-AD28EEB116B7}" dt="2025-06-30T05:03:38.873" v="270" actId="478"/>
           <ac:spMkLst>
             <pc:docMk/>
             <pc:sldMk cId="0" sldId="258"/>
             <ac:spMk id="2" creationId="{B86F49DB-55EE-06A3-9C3B-D86440B12A8D}"/>
+          </ac:spMkLst>
+        </pc:spChg>
+        <pc:spChg chg="add mod">
+          <ac:chgData name="정언종" userId="899f684f-54d4-4d98-b09f-4a5a2cd83b3f" providerId="ADAL" clId="{BA8B300D-6849-49E4-8705-AD28EEB116B7}" dt="2025-06-30T05:26:18.944" v="305"/>
+          <ac:spMkLst>
+            <pc:docMk/>
+            <pc:sldMk cId="0" sldId="258"/>
+            <ac:spMk id="2" creationId="{C1D508A9-9649-2318-B627-8DFCC6450B18}"/>
+          </ac:spMkLst>
+        </pc:spChg>
+        <pc:spChg chg="add del mod">
+          <ac:chgData name="정언종" userId="899f684f-54d4-4d98-b09f-4a5a2cd83b3f" providerId="ADAL" clId="{BA8B300D-6849-49E4-8705-AD28EEB116B7}" dt="2025-06-30T05:24:43.336" v="302" actId="478"/>
+          <ac:spMkLst>
+            <pc:docMk/>
+            <pc:sldMk cId="0" sldId="258"/>
+            <ac:spMk id="2" creationId="{F3D5A048-24E0-0AD4-0003-96E7311A1B24}"/>
+          </ac:spMkLst>
+        </pc:spChg>
+        <pc:spChg chg="add del mod">
+          <ac:chgData name="정언종" userId="899f684f-54d4-4d98-b09f-4a5a2cd83b3f" providerId="ADAL" clId="{BA8B300D-6849-49E4-8705-AD28EEB116B7}" dt="2025-06-30T05:26:52.306" v="309" actId="478"/>
+          <ac:spMkLst>
+            <pc:docMk/>
+            <pc:sldMk cId="0" sldId="258"/>
+            <ac:spMk id="3" creationId="{65CD8FF3-0753-08C0-83B7-9C6C556750EF}"/>
+          </ac:spMkLst>
+        </pc:spChg>
+        <pc:spChg chg="add mod">
+          <ac:chgData name="정언종" userId="899f684f-54d4-4d98-b09f-4a5a2cd83b3f" providerId="ADAL" clId="{BA8B300D-6849-49E4-8705-AD28EEB116B7}" dt="2025-06-30T05:27:40.163" v="310"/>
+          <ac:spMkLst>
+            <pc:docMk/>
+            <pc:sldMk cId="0" sldId="258"/>
+            <ac:spMk id="3" creationId="{771F0DA8-60AB-94D5-0EBA-9E8378E6072A}"/>
+          </ac:spMkLst>
+        </pc:spChg>
+        <pc:spChg chg="add mod">
+          <ac:chgData name="정언종" userId="899f684f-54d4-4d98-b09f-4a5a2cd83b3f" providerId="ADAL" clId="{BA8B300D-6849-49E4-8705-AD28EEB116B7}" dt="2025-06-30T05:06:39.140" v="293" actId="20577"/>
+          <ac:spMkLst>
+            <pc:docMk/>
+            <pc:sldMk cId="0" sldId="258"/>
+            <ac:spMk id="3" creationId="{7F823812-ACE8-4DE6-8C36-52092DAF86AE}"/>
+          </ac:spMkLst>
+        </pc:spChg>
+        <pc:spChg chg="add mod">
+          <ac:chgData name="정언종" userId="899f684f-54d4-4d98-b09f-4a5a2cd83b3f" providerId="ADAL" clId="{BA8B300D-6849-49E4-8705-AD28EEB116B7}" dt="2025-06-30T05:27:40.163" v="310"/>
+          <ac:spMkLst>
+            <pc:docMk/>
+            <pc:sldMk cId="0" sldId="258"/>
+            <ac:spMk id="4" creationId="{3E09EE98-E906-7E0E-41D4-7084CB9FB771}"/>
+          </ac:spMkLst>
+        </pc:spChg>
+        <pc:spChg chg="add del mod">
+          <ac:chgData name="정언종" userId="899f684f-54d4-4d98-b09f-4a5a2cd83b3f" providerId="ADAL" clId="{BA8B300D-6849-49E4-8705-AD28EEB116B7}" dt="2025-06-30T05:24:43.336" v="302" actId="478"/>
+          <ac:spMkLst>
+            <pc:docMk/>
+            <pc:sldMk cId="0" sldId="258"/>
+            <ac:spMk id="4" creationId="{5FF0B10A-BF65-EC91-72A6-71423057A23B}"/>
+          </ac:spMkLst>
+        </pc:spChg>
+        <pc:spChg chg="add del mod">
+          <ac:chgData name="정언종" userId="899f684f-54d4-4d98-b09f-4a5a2cd83b3f" providerId="ADAL" clId="{BA8B300D-6849-49E4-8705-AD28EEB116B7}" dt="2025-06-30T05:26:52.306" v="309" actId="478"/>
+          <ac:spMkLst>
+            <pc:docMk/>
+            <pc:sldMk cId="0" sldId="258"/>
+            <ac:spMk id="4" creationId="{E6971A5D-5E2A-0BDB-4D4C-33D326D65B5F}"/>
+          </ac:spMkLst>
+        </pc:spChg>
+        <pc:spChg chg="add del mod">
+          <ac:chgData name="정언종" userId="899f684f-54d4-4d98-b09f-4a5a2cd83b3f" providerId="ADAL" clId="{BA8B300D-6849-49E4-8705-AD28EEB116B7}" dt="2025-06-30T05:24:43.336" v="302" actId="478"/>
+          <ac:spMkLst>
+            <pc:docMk/>
+            <pc:sldMk cId="0" sldId="258"/>
+            <ac:spMk id="5" creationId="{1B5BF14D-4D80-F302-E3E9-45E97E806EC7}"/>
           </ac:spMkLst>
         </pc:spChg>
         <pc:spChg chg="del">
@@ -490,12 +514,92 @@
             <ac:spMk id="5" creationId="{70B5A989-B76A-E0DC-ADB6-B0543323AC6B}"/>
           </ac:spMkLst>
         </pc:spChg>
-        <pc:spChg chg="mod">
-          <ac:chgData name="정언종" userId="899f684f-54d4-4d98-b09f-4a5a2cd83b3f" providerId="ADAL" clId="{BA8B300D-6849-49E4-8705-AD28EEB116B7}" dt="2025-06-29T17:54:12.904" v="250" actId="2711"/>
+        <pc:spChg chg="add mod">
+          <ac:chgData name="정언종" userId="899f684f-54d4-4d98-b09f-4a5a2cd83b3f" providerId="ADAL" clId="{BA8B300D-6849-49E4-8705-AD28EEB116B7}" dt="2025-06-30T05:26:49.633" v="308"/>
+          <ac:spMkLst>
+            <pc:docMk/>
+            <pc:sldMk cId="0" sldId="258"/>
+            <ac:spMk id="5" creationId="{8198EEC7-83B5-DB6A-012A-587FC6C90946}"/>
+          </ac:spMkLst>
+        </pc:spChg>
+        <pc:spChg chg="add del mod">
+          <ac:chgData name="정언종" userId="899f684f-54d4-4d98-b09f-4a5a2cd83b3f" providerId="ADAL" clId="{BA8B300D-6849-49E4-8705-AD28EEB116B7}" dt="2025-06-30T05:24:43.336" v="302" actId="478"/>
+          <ac:spMkLst>
+            <pc:docMk/>
+            <pc:sldMk cId="0" sldId="258"/>
+            <ac:spMk id="6" creationId="{5B9C2267-0268-0921-C3B5-C80D8B211068}"/>
+          </ac:spMkLst>
+        </pc:spChg>
+        <pc:spChg chg="add mod">
+          <ac:chgData name="정언종" userId="899f684f-54d4-4d98-b09f-4a5a2cd83b3f" providerId="ADAL" clId="{BA8B300D-6849-49E4-8705-AD28EEB116B7}" dt="2025-06-30T05:26:49.633" v="308"/>
+          <ac:spMkLst>
+            <pc:docMk/>
+            <pc:sldMk cId="0" sldId="258"/>
+            <ac:spMk id="6" creationId="{AEAF5BB0-0117-7BF0-B378-6A30E74A4C8D}"/>
+          </ac:spMkLst>
+        </pc:spChg>
+        <pc:spChg chg="del mod">
+          <ac:chgData name="정언종" userId="899f684f-54d4-4d98-b09f-4a5a2cd83b3f" providerId="ADAL" clId="{BA8B300D-6849-49E4-8705-AD28EEB116B7}" dt="2025-06-30T05:24:43.336" v="302" actId="478"/>
           <ac:spMkLst>
             <pc:docMk/>
             <pc:sldMk cId="0" sldId="258"/>
             <ac:spMk id="7" creationId="{0E1C9C90-B828-9141-CD35-641F100760D2}"/>
+          </ac:spMkLst>
+        </pc:spChg>
+        <pc:spChg chg="add mod">
+          <ac:chgData name="정언종" userId="899f684f-54d4-4d98-b09f-4a5a2cd83b3f" providerId="ADAL" clId="{BA8B300D-6849-49E4-8705-AD28EEB116B7}" dt="2025-06-30T05:26:49.633" v="308"/>
+          <ac:spMkLst>
+            <pc:docMk/>
+            <pc:sldMk cId="0" sldId="258"/>
+            <ac:spMk id="7" creationId="{17E0448B-F19D-95B5-9AF8-6C5156DFED76}"/>
+          </ac:spMkLst>
+        </pc:spChg>
+        <pc:spChg chg="add del mod">
+          <ac:chgData name="정언종" userId="899f684f-54d4-4d98-b09f-4a5a2cd83b3f" providerId="ADAL" clId="{BA8B300D-6849-49E4-8705-AD28EEB116B7}" dt="2025-06-30T05:24:43.336" v="302" actId="478"/>
+          <ac:spMkLst>
+            <pc:docMk/>
+            <pc:sldMk cId="0" sldId="258"/>
+            <ac:spMk id="8" creationId="{25D6EA53-471E-94CF-03B5-68A75B318A99}"/>
+          </ac:spMkLst>
+        </pc:spChg>
+        <pc:spChg chg="add mod">
+          <ac:chgData name="정언종" userId="899f684f-54d4-4d98-b09f-4a5a2cd83b3f" providerId="ADAL" clId="{BA8B300D-6849-49E4-8705-AD28EEB116B7}" dt="2025-06-30T05:26:49.633" v="308"/>
+          <ac:spMkLst>
+            <pc:docMk/>
+            <pc:sldMk cId="0" sldId="258"/>
+            <ac:spMk id="8" creationId="{ECF8EB8A-0666-A733-29C1-FE517D21659C}"/>
+          </ac:spMkLst>
+        </pc:spChg>
+        <pc:spChg chg="add del mod">
+          <ac:chgData name="정언종" userId="899f684f-54d4-4d98-b09f-4a5a2cd83b3f" providerId="ADAL" clId="{BA8B300D-6849-49E4-8705-AD28EEB116B7}" dt="2025-06-30T05:24:43.336" v="302" actId="478"/>
+          <ac:spMkLst>
+            <pc:docMk/>
+            <pc:sldMk cId="0" sldId="258"/>
+            <ac:spMk id="9" creationId="{9980C902-9508-4FA9-7AD3-04ECA3FFB526}"/>
+          </ac:spMkLst>
+        </pc:spChg>
+        <pc:spChg chg="add del mod">
+          <ac:chgData name="정언종" userId="899f684f-54d4-4d98-b09f-4a5a2cd83b3f" providerId="ADAL" clId="{BA8B300D-6849-49E4-8705-AD28EEB116B7}" dt="2025-06-30T05:30:53.382" v="312" actId="478"/>
+          <ac:spMkLst>
+            <pc:docMk/>
+            <pc:sldMk cId="0" sldId="258"/>
+            <ac:spMk id="10" creationId="{DA8D7464-C2AA-1276-45BE-6F11FB17DB5C}"/>
+          </ac:spMkLst>
+        </pc:spChg>
+        <pc:spChg chg="add del mod">
+          <ac:chgData name="정언종" userId="899f684f-54d4-4d98-b09f-4a5a2cd83b3f" providerId="ADAL" clId="{BA8B300D-6849-49E4-8705-AD28EEB116B7}" dt="2025-06-30T05:24:43.336" v="302" actId="478"/>
+          <ac:spMkLst>
+            <pc:docMk/>
+            <pc:sldMk cId="0" sldId="258"/>
+            <ac:spMk id="10" creationId="{E2C486B1-83A7-1787-7E90-2ACB5226A893}"/>
+          </ac:spMkLst>
+        </pc:spChg>
+        <pc:spChg chg="add del mod">
+          <ac:chgData name="정언종" userId="899f684f-54d4-4d98-b09f-4a5a2cd83b3f" providerId="ADAL" clId="{BA8B300D-6849-49E4-8705-AD28EEB116B7}" dt="2025-06-30T05:30:52.224" v="311" actId="478"/>
+          <ac:spMkLst>
+            <pc:docMk/>
+            <pc:sldMk cId="0" sldId="258"/>
+            <ac:spMk id="11" creationId="{1EB35F6C-055E-4F7C-C880-1280F894A537}"/>
           </ac:spMkLst>
         </pc:spChg>
         <pc:spChg chg="del">
@@ -506,6 +610,110 @@
             <ac:spMk id="11" creationId="{3C0631ED-5D14-18F2-D10C-67CD12CC4C58}"/>
           </ac:spMkLst>
         </pc:spChg>
+        <pc:spChg chg="add del mod">
+          <ac:chgData name="정언종" userId="899f684f-54d4-4d98-b09f-4a5a2cd83b3f" providerId="ADAL" clId="{BA8B300D-6849-49E4-8705-AD28EEB116B7}" dt="2025-06-30T05:24:43.336" v="302" actId="478"/>
+          <ac:spMkLst>
+            <pc:docMk/>
+            <pc:sldMk cId="0" sldId="258"/>
+            <ac:spMk id="11" creationId="{D47F05DB-9961-DDE2-36DA-81F6BCDC0D50}"/>
+          </ac:spMkLst>
+        </pc:spChg>
+        <pc:spChg chg="add del mod">
+          <ac:chgData name="정언종" userId="899f684f-54d4-4d98-b09f-4a5a2cd83b3f" providerId="ADAL" clId="{BA8B300D-6849-49E4-8705-AD28EEB116B7}" dt="2025-06-30T05:30:52.224" v="311" actId="478"/>
+          <ac:spMkLst>
+            <pc:docMk/>
+            <pc:sldMk cId="0" sldId="258"/>
+            <ac:spMk id="12" creationId="{BBBB4378-C465-72BF-1756-115CC4D32FDF}"/>
+          </ac:spMkLst>
+        </pc:spChg>
+        <pc:spChg chg="add del mod">
+          <ac:chgData name="정언종" userId="899f684f-54d4-4d98-b09f-4a5a2cd83b3f" providerId="ADAL" clId="{BA8B300D-6849-49E4-8705-AD28EEB116B7}" dt="2025-06-30T05:24:43.336" v="302" actId="478"/>
+          <ac:spMkLst>
+            <pc:docMk/>
+            <pc:sldMk cId="0" sldId="258"/>
+            <ac:spMk id="12" creationId="{E6ADFA2C-D923-C09C-3774-8522746E46A9}"/>
+          </ac:spMkLst>
+        </pc:spChg>
+        <pc:spChg chg="del">
+          <ac:chgData name="정언종" userId="899f684f-54d4-4d98-b09f-4a5a2cd83b3f" providerId="ADAL" clId="{BA8B300D-6849-49E4-8705-AD28EEB116B7}" dt="2025-06-30T05:25:36.865" v="304" actId="478"/>
+          <ac:spMkLst>
+            <pc:docMk/>
+            <pc:sldMk cId="0" sldId="258"/>
+            <ac:spMk id="13" creationId="{10645C3E-9656-0B66-582E-5D257E228544}"/>
+          </ac:spMkLst>
+        </pc:spChg>
+        <pc:spChg chg="add del mod">
+          <ac:chgData name="정언종" userId="899f684f-54d4-4d98-b09f-4a5a2cd83b3f" providerId="ADAL" clId="{BA8B300D-6849-49E4-8705-AD28EEB116B7}" dt="2025-06-30T05:30:52.224" v="311" actId="478"/>
+          <ac:spMkLst>
+            <pc:docMk/>
+            <pc:sldMk cId="0" sldId="258"/>
+            <ac:spMk id="13" creationId="{7FD1F48C-4152-A7EE-959A-29E17C54C936}"/>
+          </ac:spMkLst>
+        </pc:spChg>
+        <pc:spChg chg="del">
+          <ac:chgData name="정언종" userId="899f684f-54d4-4d98-b09f-4a5a2cd83b3f" providerId="ADAL" clId="{BA8B300D-6849-49E4-8705-AD28EEB116B7}" dt="2025-06-30T05:30:52.224" v="311" actId="478"/>
+          <ac:spMkLst>
+            <pc:docMk/>
+            <pc:sldMk cId="0" sldId="258"/>
+            <ac:spMk id="14" creationId="{65B858DA-E506-D1F5-D051-E20CD01B18AD}"/>
+          </ac:spMkLst>
+        </pc:spChg>
+        <pc:spChg chg="add del mod">
+          <ac:chgData name="정언종" userId="899f684f-54d4-4d98-b09f-4a5a2cd83b3f" providerId="ADAL" clId="{BA8B300D-6849-49E4-8705-AD28EEB116B7}" dt="2025-06-30T05:30:52.224" v="311" actId="478"/>
+          <ac:spMkLst>
+            <pc:docMk/>
+            <pc:sldMk cId="0" sldId="258"/>
+            <ac:spMk id="16" creationId="{98825E0C-6F24-8B10-A724-1C638B79DF0A}"/>
+          </ac:spMkLst>
+        </pc:spChg>
+        <pc:spChg chg="add del mod">
+          <ac:chgData name="정언종" userId="899f684f-54d4-4d98-b09f-4a5a2cd83b3f" providerId="ADAL" clId="{BA8B300D-6849-49E4-8705-AD28EEB116B7}" dt="2025-06-30T05:30:52.224" v="311" actId="478"/>
+          <ac:spMkLst>
+            <pc:docMk/>
+            <pc:sldMk cId="0" sldId="258"/>
+            <ac:spMk id="17" creationId="{202F3409-C927-AAF8-1C91-A8B63AA3CCCD}"/>
+          </ac:spMkLst>
+        </pc:spChg>
+        <pc:spChg chg="add mod">
+          <ac:chgData name="정언종" userId="899f684f-54d4-4d98-b09f-4a5a2cd83b3f" providerId="ADAL" clId="{BA8B300D-6849-49E4-8705-AD28EEB116B7}" dt="2025-06-30T05:27:40.163" v="310"/>
+          <ac:spMkLst>
+            <pc:docMk/>
+            <pc:sldMk cId="0" sldId="258"/>
+            <ac:spMk id="18" creationId="{834E604F-59DC-7124-5ED0-8DFED91C7A35}"/>
+          </ac:spMkLst>
+        </pc:spChg>
+        <pc:spChg chg="add del mod">
+          <ac:chgData name="정언종" userId="899f684f-54d4-4d98-b09f-4a5a2cd83b3f" providerId="ADAL" clId="{BA8B300D-6849-49E4-8705-AD28EEB116B7}" dt="2025-06-30T05:25:36.865" v="304" actId="478"/>
+          <ac:spMkLst>
+            <pc:docMk/>
+            <pc:sldMk cId="0" sldId="258"/>
+            <ac:spMk id="19" creationId="{36D2EFFE-D048-78DF-7FAD-8B50B37A7323}"/>
+          </ac:spMkLst>
+        </pc:spChg>
+        <pc:spChg chg="add del mod">
+          <ac:chgData name="정언종" userId="899f684f-54d4-4d98-b09f-4a5a2cd83b3f" providerId="ADAL" clId="{BA8B300D-6849-49E4-8705-AD28EEB116B7}" dt="2025-06-30T05:31:00.797" v="320" actId="478"/>
+          <ac:spMkLst>
+            <pc:docMk/>
+            <pc:sldMk cId="0" sldId="258"/>
+            <ac:spMk id="19" creationId="{95476692-199E-BB7B-42BD-47D71BB5813E}"/>
+          </ac:spMkLst>
+        </pc:spChg>
+        <pc:spChg chg="add del mod">
+          <ac:chgData name="정언종" userId="899f684f-54d4-4d98-b09f-4a5a2cd83b3f" providerId="ADAL" clId="{BA8B300D-6849-49E4-8705-AD28EEB116B7}" dt="2025-06-30T05:30:58.045" v="315" actId="478"/>
+          <ac:spMkLst>
+            <pc:docMk/>
+            <pc:sldMk cId="0" sldId="258"/>
+            <ac:spMk id="20" creationId="{3EF8DA02-D45C-B1B8-391B-B508AB8F8E34}"/>
+          </ac:spMkLst>
+        </pc:spChg>
+        <pc:spChg chg="add del mod">
+          <ac:chgData name="정언종" userId="899f684f-54d4-4d98-b09f-4a5a2cd83b3f" providerId="ADAL" clId="{BA8B300D-6849-49E4-8705-AD28EEB116B7}" dt="2025-06-30T05:30:57.486" v="314" actId="478"/>
+          <ac:spMkLst>
+            <pc:docMk/>
+            <pc:sldMk cId="0" sldId="258"/>
+            <ac:spMk id="21" creationId="{C3334FF0-9CD4-408E-FA5C-6EB5FCBE363D}"/>
+          </ac:spMkLst>
+        </pc:spChg>
         <pc:spChg chg="del">
           <ac:chgData name="정언종" userId="899f684f-54d4-4d98-b09f-4a5a2cd83b3f" providerId="ADAL" clId="{BA8B300D-6849-49E4-8705-AD28EEB116B7}" dt="2025-06-29T13:16:35.871" v="0" actId="478"/>
           <ac:spMkLst>
@@ -514,12 +722,76 @@
             <ac:spMk id="21" creationId="{C617E286-2E50-6200-A698-935C77E6FA47}"/>
           </ac:spMkLst>
         </pc:spChg>
+        <pc:spChg chg="add del mod">
+          <ac:chgData name="정언종" userId="899f684f-54d4-4d98-b09f-4a5a2cd83b3f" providerId="ADAL" clId="{BA8B300D-6849-49E4-8705-AD28EEB116B7}" dt="2025-06-30T05:30:58.448" v="316" actId="478"/>
+          <ac:spMkLst>
+            <pc:docMk/>
+            <pc:sldMk cId="0" sldId="258"/>
+            <ac:spMk id="22" creationId="{9A6CCB9D-E915-E27C-B20A-64D77E8DD0FB}"/>
+          </ac:spMkLst>
+        </pc:spChg>
+        <pc:spChg chg="add del mod">
+          <ac:chgData name="정언종" userId="899f684f-54d4-4d98-b09f-4a5a2cd83b3f" providerId="ADAL" clId="{BA8B300D-6849-49E4-8705-AD28EEB116B7}" dt="2025-06-30T05:31:00.197" v="319" actId="478"/>
+          <ac:spMkLst>
+            <pc:docMk/>
+            <pc:sldMk cId="0" sldId="258"/>
+            <ac:spMk id="23" creationId="{64E0BADC-00E8-99B4-7495-2B7FBB10E1C1}"/>
+          </ac:spMkLst>
+        </pc:spChg>
+        <pc:spChg chg="add del mod">
+          <ac:chgData name="정언종" userId="899f684f-54d4-4d98-b09f-4a5a2cd83b3f" providerId="ADAL" clId="{BA8B300D-6849-49E4-8705-AD28EEB116B7}" dt="2025-06-30T05:30:59.006" v="317" actId="478"/>
+          <ac:spMkLst>
+            <pc:docMk/>
+            <pc:sldMk cId="0" sldId="258"/>
+            <ac:spMk id="24" creationId="{F770D1C0-F32D-904A-0FA8-87CF502FCAF1}"/>
+          </ac:spMkLst>
+        </pc:spChg>
+        <pc:spChg chg="add del mod">
+          <ac:chgData name="정언종" userId="899f684f-54d4-4d98-b09f-4a5a2cd83b3f" providerId="ADAL" clId="{BA8B300D-6849-49E4-8705-AD28EEB116B7}" dt="2025-06-30T05:30:59.430" v="318" actId="478"/>
+          <ac:spMkLst>
+            <pc:docMk/>
+            <pc:sldMk cId="0" sldId="258"/>
+            <ac:spMk id="25" creationId="{8852F28B-41E7-D898-BF6A-24A722DD4F22}"/>
+          </ac:spMkLst>
+        </pc:spChg>
         <pc:spChg chg="del">
           <ac:chgData name="정언종" userId="899f684f-54d4-4d98-b09f-4a5a2cd83b3f" providerId="ADAL" clId="{BA8B300D-6849-49E4-8705-AD28EEB116B7}" dt="2025-06-29T13:16:35.871" v="0" actId="478"/>
           <ac:spMkLst>
             <pc:docMk/>
             <pc:sldMk cId="0" sldId="258"/>
             <ac:spMk id="29" creationId="{91FBB09F-8EB1-A26F-3B17-BE9C24A2D345}"/>
+          </ac:spMkLst>
+        </pc:spChg>
+        <pc:spChg chg="add mod">
+          <ac:chgData name="정언종" userId="899f684f-54d4-4d98-b09f-4a5a2cd83b3f" providerId="ADAL" clId="{BA8B300D-6849-49E4-8705-AD28EEB116B7}" dt="2025-06-30T05:24:43.858" v="303"/>
+          <ac:spMkLst>
+            <pc:docMk/>
+            <pc:sldMk cId="0" sldId="258"/>
+            <ac:spMk id="31" creationId="{007789B1-779C-34BF-2CD4-538134A1CCB8}"/>
+          </ac:spMkLst>
+        </pc:spChg>
+        <pc:spChg chg="del">
+          <ac:chgData name="정언종" userId="899f684f-54d4-4d98-b09f-4a5a2cd83b3f" providerId="ADAL" clId="{BA8B300D-6849-49E4-8705-AD28EEB116B7}" dt="2025-06-30T05:25:36.865" v="304" actId="478"/>
+          <ac:spMkLst>
+            <pc:docMk/>
+            <pc:sldMk cId="0" sldId="258"/>
+            <ac:spMk id="33" creationId="{DD6628AC-906B-A46D-570A-E7C8A558E965}"/>
+          </ac:spMkLst>
+        </pc:spChg>
+        <pc:spChg chg="add mod">
+          <ac:chgData name="정언종" userId="899f684f-54d4-4d98-b09f-4a5a2cd83b3f" providerId="ADAL" clId="{BA8B300D-6849-49E4-8705-AD28EEB116B7}" dt="2025-06-30T05:24:43.858" v="303"/>
+          <ac:spMkLst>
+            <pc:docMk/>
+            <pc:sldMk cId="0" sldId="258"/>
+            <ac:spMk id="35" creationId="{8FF95C8C-5ECF-1661-3B69-3A402B1BBA19}"/>
+          </ac:spMkLst>
+        </pc:spChg>
+        <pc:spChg chg="del">
+          <ac:chgData name="정언종" userId="899f684f-54d4-4d98-b09f-4a5a2cd83b3f" providerId="ADAL" clId="{BA8B300D-6849-49E4-8705-AD28EEB116B7}" dt="2025-06-30T05:25:36.865" v="304" actId="478"/>
+          <ac:spMkLst>
+            <pc:docMk/>
+            <pc:sldMk cId="0" sldId="258"/>
+            <ac:spMk id="36" creationId="{CF490A7C-25C6-23C3-88ED-374379AE8293}"/>
           </ac:spMkLst>
         </pc:spChg>
         <pc:spChg chg="del">
@@ -546,6 +818,30 @@
             <ac:spMk id="44" creationId="{5C91290C-C80A-B22D-9C63-34057CD95569}"/>
           </ac:spMkLst>
         </pc:spChg>
+        <pc:spChg chg="add mod">
+          <ac:chgData name="정언종" userId="899f684f-54d4-4d98-b09f-4a5a2cd83b3f" providerId="ADAL" clId="{BA8B300D-6849-49E4-8705-AD28EEB116B7}" dt="2025-06-30T05:24:43.858" v="303"/>
+          <ac:spMkLst>
+            <pc:docMk/>
+            <pc:sldMk cId="0" sldId="258"/>
+            <ac:spMk id="46" creationId="{F000D836-99B8-DE2E-A11F-82F54931738E}"/>
+          </ac:spMkLst>
+        </pc:spChg>
+        <pc:spChg chg="add mod">
+          <ac:chgData name="정언종" userId="899f684f-54d4-4d98-b09f-4a5a2cd83b3f" providerId="ADAL" clId="{BA8B300D-6849-49E4-8705-AD28EEB116B7}" dt="2025-06-30T05:24:43.858" v="303"/>
+          <ac:spMkLst>
+            <pc:docMk/>
+            <pc:sldMk cId="0" sldId="258"/>
+            <ac:spMk id="60" creationId="{1836B2C4-EAB9-5825-2CA5-861C8A7D02B8}"/>
+          </ac:spMkLst>
+        </pc:spChg>
+        <pc:spChg chg="del">
+          <ac:chgData name="정언종" userId="899f684f-54d4-4d98-b09f-4a5a2cd83b3f" providerId="ADAL" clId="{BA8B300D-6849-49E4-8705-AD28EEB116B7}" dt="2025-06-30T05:25:36.865" v="304" actId="478"/>
+          <ac:spMkLst>
+            <pc:docMk/>
+            <pc:sldMk cId="0" sldId="258"/>
+            <ac:spMk id="61" creationId="{2326DBC8-6B28-60FD-782C-0984476FFE61}"/>
+          </ac:spMkLst>
+        </pc:spChg>
         <pc:spChg chg="del">
           <ac:chgData name="정언종" userId="899f684f-54d4-4d98-b09f-4a5a2cd83b3f" providerId="ADAL" clId="{BA8B300D-6849-49E4-8705-AD28EEB116B7}" dt="2025-06-29T13:16:35.871" v="0" actId="478"/>
           <ac:spMkLst>
@@ -563,11 +859,91 @@
           </ac:spMkLst>
         </pc:spChg>
         <pc:spChg chg="del">
+          <ac:chgData name="정언종" userId="899f684f-54d4-4d98-b09f-4a5a2cd83b3f" providerId="ADAL" clId="{BA8B300D-6849-49E4-8705-AD28EEB116B7}" dt="2025-06-30T05:25:36.865" v="304" actId="478"/>
+          <ac:spMkLst>
+            <pc:docMk/>
+            <pc:sldMk cId="0" sldId="258"/>
+            <ac:spMk id="66" creationId="{199B7C28-430C-FCB1-B8C0-023944575263}"/>
+          </ac:spMkLst>
+        </pc:spChg>
+        <pc:spChg chg="add mod">
+          <ac:chgData name="정언종" userId="899f684f-54d4-4d98-b09f-4a5a2cd83b3f" providerId="ADAL" clId="{BA8B300D-6849-49E4-8705-AD28EEB116B7}" dt="2025-06-30T05:24:43.858" v="303"/>
+          <ac:spMkLst>
+            <pc:docMk/>
+            <pc:sldMk cId="0" sldId="258"/>
+            <ac:spMk id="69" creationId="{FDFE1EE8-D101-DC18-2F25-9414257A88D0}"/>
+          </ac:spMkLst>
+        </pc:spChg>
+        <pc:spChg chg="del">
           <ac:chgData name="정언종" userId="899f684f-54d4-4d98-b09f-4a5a2cd83b3f" providerId="ADAL" clId="{BA8B300D-6849-49E4-8705-AD28EEB116B7}" dt="2025-06-29T13:16:35.871" v="0" actId="478"/>
           <ac:spMkLst>
             <pc:docMk/>
             <pc:sldMk cId="0" sldId="258"/>
             <ac:spMk id="71" creationId="{E7F97637-05E1-6161-A657-5FF2A80A13B1}"/>
+          </ac:spMkLst>
+        </pc:spChg>
+        <pc:spChg chg="add mod">
+          <ac:chgData name="정언종" userId="899f684f-54d4-4d98-b09f-4a5a2cd83b3f" providerId="ADAL" clId="{BA8B300D-6849-49E4-8705-AD28EEB116B7}" dt="2025-06-30T05:24:43.858" v="303"/>
+          <ac:spMkLst>
+            <pc:docMk/>
+            <pc:sldMk cId="0" sldId="258"/>
+            <ac:spMk id="74" creationId="{00C2272B-99D9-AE11-775D-DEFE1330C70B}"/>
+          </ac:spMkLst>
+        </pc:spChg>
+        <pc:spChg chg="del">
+          <ac:chgData name="정언종" userId="899f684f-54d4-4d98-b09f-4a5a2cd83b3f" providerId="ADAL" clId="{BA8B300D-6849-49E4-8705-AD28EEB116B7}" dt="2025-06-30T05:25:36.865" v="304" actId="478"/>
+          <ac:spMkLst>
+            <pc:docMk/>
+            <pc:sldMk cId="0" sldId="258"/>
+            <ac:spMk id="82" creationId="{D6B9E6CC-E4BE-9145-AD16-F26CB3E6917B}"/>
+          </ac:spMkLst>
+        </pc:spChg>
+        <pc:spChg chg="add mod">
+          <ac:chgData name="정언종" userId="899f684f-54d4-4d98-b09f-4a5a2cd83b3f" providerId="ADAL" clId="{BA8B300D-6849-49E4-8705-AD28EEB116B7}" dt="2025-06-30T05:24:43.858" v="303"/>
+          <ac:spMkLst>
+            <pc:docMk/>
+            <pc:sldMk cId="0" sldId="258"/>
+            <ac:spMk id="86" creationId="{F5251CAF-C740-902B-AC1A-8E8C92EE5E42}"/>
+          </ac:spMkLst>
+        </pc:spChg>
+        <pc:spChg chg="del">
+          <ac:chgData name="정언종" userId="899f684f-54d4-4d98-b09f-4a5a2cd83b3f" providerId="ADAL" clId="{BA8B300D-6849-49E4-8705-AD28EEB116B7}" dt="2025-06-30T05:25:36.865" v="304" actId="478"/>
+          <ac:spMkLst>
+            <pc:docMk/>
+            <pc:sldMk cId="0" sldId="258"/>
+            <ac:spMk id="88" creationId="{7DCE72E8-E33D-795E-889D-9614DFA295A8}"/>
+          </ac:spMkLst>
+        </pc:spChg>
+        <pc:spChg chg="add mod">
+          <ac:chgData name="정언종" userId="899f684f-54d4-4d98-b09f-4a5a2cd83b3f" providerId="ADAL" clId="{BA8B300D-6849-49E4-8705-AD28EEB116B7}" dt="2025-06-30T05:24:43.858" v="303"/>
+          <ac:spMkLst>
+            <pc:docMk/>
+            <pc:sldMk cId="0" sldId="258"/>
+            <ac:spMk id="90" creationId="{6F8756A1-5967-63A6-ED36-D9FD702AB56F}"/>
+          </ac:spMkLst>
+        </pc:spChg>
+        <pc:spChg chg="add mod">
+          <ac:chgData name="정언종" userId="899f684f-54d4-4d98-b09f-4a5a2cd83b3f" providerId="ADAL" clId="{BA8B300D-6849-49E4-8705-AD28EEB116B7}" dt="2025-06-30T05:24:43.858" v="303"/>
+          <ac:spMkLst>
+            <pc:docMk/>
+            <pc:sldMk cId="0" sldId="258"/>
+            <ac:spMk id="92" creationId="{C55C59B1-0019-D67D-D643-8B34421FC371}"/>
+          </ac:spMkLst>
+        </pc:spChg>
+        <pc:spChg chg="del">
+          <ac:chgData name="정언종" userId="899f684f-54d4-4d98-b09f-4a5a2cd83b3f" providerId="ADAL" clId="{BA8B300D-6849-49E4-8705-AD28EEB116B7}" dt="2025-06-30T05:25:36.865" v="304" actId="478"/>
+          <ac:spMkLst>
+            <pc:docMk/>
+            <pc:sldMk cId="0" sldId="258"/>
+            <ac:spMk id="93" creationId="{4CBF6317-1F6E-9FD0-4795-C7C98E4CAED3}"/>
+          </ac:spMkLst>
+        </pc:spChg>
+        <pc:spChg chg="del">
+          <ac:chgData name="정언종" userId="899f684f-54d4-4d98-b09f-4a5a2cd83b3f" providerId="ADAL" clId="{BA8B300D-6849-49E4-8705-AD28EEB116B7}" dt="2025-06-30T05:25:36.865" v="304" actId="478"/>
+          <ac:spMkLst>
+            <pc:docMk/>
+            <pc:sldMk cId="0" sldId="258"/>
+            <ac:spMk id="106" creationId="{BDC90588-FB6D-DAE3-9A9B-D6364C1B3FAD}"/>
           </ac:spMkLst>
         </pc:spChg>
         <pc:spChg chg="del mod">
@@ -576,6 +952,46 @@
             <pc:docMk/>
             <pc:sldMk cId="0" sldId="258"/>
             <ac:spMk id="125" creationId="{162FDB92-3C12-8C53-6966-84B980DD363B}"/>
+          </ac:spMkLst>
+        </pc:spChg>
+      </pc:sldChg>
+    </pc:docChg>
+  </pc:docChgLst>
+  <pc:docChgLst>
+    <pc:chgData name="정언종" userId="899f684f-54d4-4d98-b09f-4a5a2cd83b3f" providerId="ADAL" clId="{9F6818D8-6426-4543-95E5-5F8B3955A444}"/>
+    <pc:docChg chg="modSld">
+      <pc:chgData name="정언종" userId="899f684f-54d4-4d98-b09f-4a5a2cd83b3f" providerId="ADAL" clId="{9F6818D8-6426-4543-95E5-5F8B3955A444}" dt="2025-06-25T23:35:43.121" v="0"/>
+      <pc:docMkLst>
+        <pc:docMk/>
+      </pc:docMkLst>
+      <pc:sldChg chg="modSp">
+        <pc:chgData name="정언종" userId="899f684f-54d4-4d98-b09f-4a5a2cd83b3f" providerId="ADAL" clId="{9F6818D8-6426-4543-95E5-5F8B3955A444}" dt="2025-06-25T23:35:43.121" v="0"/>
+        <pc:sldMkLst>
+          <pc:docMk/>
+          <pc:sldMk cId="0" sldId="258"/>
+        </pc:sldMkLst>
+      </pc:sldChg>
+    </pc:docChg>
+  </pc:docChgLst>
+  <pc:docChgLst>
+    <pc:chgData name="정언종" userId="899f684f-54d4-4d98-b09f-4a5a2cd83b3f" providerId="ADAL" clId="{7184E60B-E66C-45CE-97CB-E4BD1290C952}"/>
+    <pc:docChg chg="undo custSel modSld">
+      <pc:chgData name="정언종" userId="899f684f-54d4-4d98-b09f-4a5a2cd83b3f" providerId="ADAL" clId="{7184E60B-E66C-45CE-97CB-E4BD1290C952}" dt="2025-05-21T00:18:03.338" v="20" actId="20577"/>
+      <pc:docMkLst>
+        <pc:docMk/>
+      </pc:docMkLst>
+      <pc:sldChg chg="modSp mod">
+        <pc:chgData name="정언종" userId="899f684f-54d4-4d98-b09f-4a5a2cd83b3f" providerId="ADAL" clId="{7184E60B-E66C-45CE-97CB-E4BD1290C952}" dt="2025-05-21T00:18:03.338" v="20" actId="20577"/>
+        <pc:sldMkLst>
+          <pc:docMk/>
+          <pc:sldMk cId="0" sldId="256"/>
+        </pc:sldMkLst>
+        <pc:spChg chg="mod">
+          <ac:chgData name="정언종" userId="899f684f-54d4-4d98-b09f-4a5a2cd83b3f" providerId="ADAL" clId="{7184E60B-E66C-45CE-97CB-E4BD1290C952}" dt="2025-05-21T00:18:03.338" v="20" actId="20577"/>
+          <ac:spMkLst>
+            <pc:docMk/>
+            <pc:sldMk cId="0" sldId="256"/>
+            <ac:spMk id="258" creationId="{00000000-0000-0000-0000-000000000000}"/>
           </ac:spMkLst>
         </pc:spChg>
       </pc:sldChg>
@@ -855,6 +1271,16 @@
           <a:bodyPr/>
           <a:lstStyle/>
           <a:p>
+            <a:r>
+              <a:rPr lang="en-US" altLang="ko-KR"/>
+              <a:t>#alias: Brands&gt;Types as Types</a:t>
+            </a:r>
+          </a:p>
+          <a:p>
+            <a:r>
+              <a:rPr lang="en-US" altLang="ko-KR"/>
+              <a:t>#alias: Brands&gt;Types&gt;Items as Items</a:t>
+            </a:r>
             <a:endParaRPr lang="ko-KR" altLang="en-US"/>
           </a:p>
         </p:txBody>
@@ -4906,7 +5332,7 @@
           </a:ln>
           <a:extLst>
             <a:ext uri="{C572A759-6A51-4108-AA02-DFA0A04FC94B}">
-              <ma14:wrappingTextBoxFlag xmlns="" xmlns:m="http://schemas.openxmlformats.org/officeDocument/2006/math" xmlns:a14="http://schemas.microsoft.com/office/drawing/2010/main" xmlns:ma14="http://schemas.microsoft.com/office/mac/drawingml/2011/main" val="1"/>
+              <ma14:wrappingTextBoxFlag xmlns:ma14="http://schemas.microsoft.com/office/mac/drawingml/2011/main" xmlns:a14="http://schemas.microsoft.com/office/drawing/2010/main" xmlns:m="http://schemas.openxmlformats.org/officeDocument/2006/math" xmlns="" val="1"/>
             </a:ext>
           </a:extLst>
         </p:spPr>
@@ -4945,7 +5371,7 @@
           </a:ln>
           <a:extLst>
             <a:ext uri="{C572A759-6A51-4108-AA02-DFA0A04FC94B}">
-              <ma14:wrappingTextBoxFlag xmlns="" xmlns:m="http://schemas.openxmlformats.org/officeDocument/2006/math" xmlns:a14="http://schemas.microsoft.com/office/drawing/2010/main" xmlns:ma14="http://schemas.microsoft.com/office/mac/drawingml/2011/main" val="1"/>
+              <ma14:wrappingTextBoxFlag xmlns:ma14="http://schemas.microsoft.com/office/mac/drawingml/2011/main" xmlns:a14="http://schemas.microsoft.com/office/drawing/2010/main" xmlns:m="http://schemas.openxmlformats.org/officeDocument/2006/math" xmlns="" val="1"/>
             </a:ext>
           </a:extLst>
         </p:spPr>
@@ -5817,7 +6243,7 @@
           </a:ln>
           <a:extLst>
             <a:ext uri="{C572A759-6A51-4108-AA02-DFA0A04FC94B}">
-              <ma14:wrappingTextBoxFlag xmlns="" xmlns:m="http://schemas.openxmlformats.org/officeDocument/2006/math" xmlns:a14="http://schemas.microsoft.com/office/drawing/2010/main" xmlns:ma14="http://schemas.microsoft.com/office/mac/drawingml/2011/main" val="1"/>
+              <ma14:wrappingTextBoxFlag xmlns:ma14="http://schemas.microsoft.com/office/mac/drawingml/2011/main" xmlns:a14="http://schemas.microsoft.com/office/drawing/2010/main" xmlns:m="http://schemas.openxmlformats.org/officeDocument/2006/math" xmlns="" val="1"/>
             </a:ext>
           </a:extLst>
         </p:spPr>
@@ -5870,7 +6296,7 @@
           </a:ln>
           <a:extLst>
             <a:ext uri="{C572A759-6A51-4108-AA02-DFA0A04FC94B}">
-              <ma14:wrappingTextBoxFlag xmlns="" xmlns:m="http://schemas.openxmlformats.org/officeDocument/2006/math" xmlns:a14="http://schemas.microsoft.com/office/drawing/2010/main" xmlns:ma14="http://schemas.microsoft.com/office/mac/drawingml/2011/main" val="1"/>
+              <ma14:wrappingTextBoxFlag xmlns:ma14="http://schemas.microsoft.com/office/mac/drawingml/2011/main" xmlns:a14="http://schemas.microsoft.com/office/drawing/2010/main" xmlns:m="http://schemas.openxmlformats.org/officeDocument/2006/math" xmlns="" val="1"/>
             </a:ext>
           </a:extLst>
         </p:spPr>
@@ -5918,7 +6344,7 @@
           </a:ln>
           <a:extLst>
             <a:ext uri="{C572A759-6A51-4108-AA02-DFA0A04FC94B}">
-              <ma14:wrappingTextBoxFlag xmlns="" xmlns:m="http://schemas.openxmlformats.org/officeDocument/2006/math" xmlns:a14="http://schemas.microsoft.com/office/drawing/2010/main" xmlns:ma14="http://schemas.microsoft.com/office/mac/drawingml/2011/main" val="1"/>
+              <ma14:wrappingTextBoxFlag xmlns:ma14="http://schemas.microsoft.com/office/mac/drawingml/2011/main" xmlns:a14="http://schemas.microsoft.com/office/drawing/2010/main" xmlns:m="http://schemas.openxmlformats.org/officeDocument/2006/math" xmlns="" val="1"/>
             </a:ext>
           </a:extLst>
         </p:spPr>
@@ -6038,7 +6464,7 @@
           </a:ln>
           <a:extLst>
             <a:ext uri="{C572A759-6A51-4108-AA02-DFA0A04FC94B}">
-              <ma14:wrappingTextBoxFlag xmlns="" xmlns:m="http://schemas.openxmlformats.org/officeDocument/2006/math" xmlns:a14="http://schemas.microsoft.com/office/drawing/2010/main" xmlns:ma14="http://schemas.microsoft.com/office/mac/drawingml/2011/main" val="1"/>
+              <ma14:wrappingTextBoxFlag xmlns:ma14="http://schemas.microsoft.com/office/mac/drawingml/2011/main" xmlns:a14="http://schemas.microsoft.com/office/drawing/2010/main" xmlns:m="http://schemas.openxmlformats.org/officeDocument/2006/math" xmlns="" val="1"/>
             </a:ext>
           </a:extLst>
         </p:spPr>
@@ -6108,10 +6534,10 @@
       </p:grpSpPr>
       <p:sp>
         <p:nvSpPr>
-          <p:cNvPr id="7" name="TextBox 6">
+          <p:cNvPr id="15" name="TextBox 14">
             <a:extLst>
               <a:ext uri="{FF2B5EF4-FFF2-40B4-BE49-F238E27FC236}">
-                <a16:creationId xmlns:a16="http://schemas.microsoft.com/office/drawing/2014/main" id="{0E1C9C90-B828-9141-CD35-641F100760D2}"/>
+                <a16:creationId xmlns:a16="http://schemas.microsoft.com/office/drawing/2014/main" id="{654C8B0C-C443-864B-61B2-D6E9D0B98B55}"/>
               </a:ext>
             </a:extLst>
           </p:cNvPr>
@@ -6154,22 +6580,90 @@
           <a:p>
             <a:r>
               <a:rPr lang="en-US" altLang="ko-KR">
-                <a:latin typeface="맑은 고딕 (제목)"/>
+                <a:latin typeface="LINE Seed Sans KR Bold"/>
               </a:rPr>
-              <a:t>${Brands&gt;Types[0].Key}</a:t>
+              <a:t>${</a:t>
+            </a:r>
+            <a:r>
+              <a:rPr lang="en-US" altLang="ko-KR"/>
+              <a:t>Types</a:t>
+            </a:r>
+            <a:r>
+              <a:rPr lang="en-US" altLang="ko-KR">
+                <a:latin typeface="LINE Seed Sans KR Bold"/>
+              </a:rPr>
+              <a:t>[0].Key}</a:t>
             </a:r>
             <a:endParaRPr lang="ko-KR" altLang="en-US" dirty="0">
-              <a:latin typeface="맑은 고딕 (제목)"/>
+              <a:latin typeface="LINE Seed Sans KR Bold"/>
             </a:endParaRPr>
           </a:p>
         </p:txBody>
       </p:sp>
       <p:sp>
         <p:nvSpPr>
-          <p:cNvPr id="2" name="TextBox 1">
+          <p:cNvPr id="2" name="object 2">
             <a:extLst>
               <a:ext uri="{FF2B5EF4-FFF2-40B4-BE49-F238E27FC236}">
-                <a16:creationId xmlns:a16="http://schemas.microsoft.com/office/drawing/2014/main" id="{B86F49DB-55EE-06A3-9C3B-D86440B12A8D}"/>
+                <a16:creationId xmlns:a16="http://schemas.microsoft.com/office/drawing/2014/main" id="{C1D508A9-9649-2318-B627-8DFCC6450B18}"/>
+              </a:ext>
+            </a:extLst>
+          </p:cNvPr>
+          <p:cNvSpPr/>
+          <p:nvPr/>
+        </p:nvSpPr>
+        <p:spPr>
+          <a:xfrm flipV="1">
+            <a:off x="463551" y="274892"/>
+            <a:ext cx="11340000" cy="18000"/>
+          </a:xfrm>
+          <a:custGeom>
+            <a:avLst/>
+            <a:gdLst/>
+            <a:ahLst/>
+            <a:cxnLst/>
+            <a:rect l="l" t="t" r="r" b="b"/>
+            <a:pathLst>
+              <a:path w="10332720" h="13970">
+                <a:moveTo>
+                  <a:pt x="10332720" y="0"/>
+                </a:moveTo>
+                <a:lnTo>
+                  <a:pt x="0" y="0"/>
+                </a:lnTo>
+                <a:lnTo>
+                  <a:pt x="0" y="13717"/>
+                </a:lnTo>
+                <a:lnTo>
+                  <a:pt x="10332720" y="13717"/>
+                </a:lnTo>
+                <a:lnTo>
+                  <a:pt x="10332720" y="0"/>
+                </a:lnTo>
+                <a:close/>
+              </a:path>
+            </a:pathLst>
+          </a:custGeom>
+          <a:solidFill>
+            <a:srgbClr val="000000"/>
+          </a:solidFill>
+        </p:spPr>
+        <p:txBody>
+          <a:bodyPr wrap="square" lIns="0" tIns="0" rIns="0" bIns="0" rtlCol="0"/>
+          <a:lstStyle/>
+          <a:p>
+            <a:endParaRPr sz="1632">
+              <a:latin typeface="LINE Seed Sans KR Bold"/>
+            </a:endParaRPr>
+          </a:p>
+        </p:txBody>
+      </p:sp>
+      <p:sp>
+        <p:nvSpPr>
+          <p:cNvPr id="5" name="TextBox 4">
+            <a:extLst>
+              <a:ext uri="{FF2B5EF4-FFF2-40B4-BE49-F238E27FC236}">
+                <a16:creationId xmlns:a16="http://schemas.microsoft.com/office/drawing/2014/main" id="{8198EEC7-83B5-DB6A-012A-587FC6C90946}"/>
               </a:ext>
             </a:extLst>
           </p:cNvPr>
@@ -6178,8 +6672,8 @@
         </p:nvSpPr>
         <p:spPr>
           <a:xfrm>
-            <a:off x="2513259" y="1541458"/>
-            <a:ext cx="6494251" cy="369332"/>
+            <a:off x="762802" y="4593636"/>
+            <a:ext cx="506076" cy="215440"/>
           </a:xfrm>
           <a:prstGeom prst="rect">
             <a:avLst/>
@@ -6205,62 +6699,121 @@
           <a:fontRef idx="none"/>
         </p:style>
         <p:txBody>
-          <a:bodyPr wrap="square">
+          <a:bodyPr rot="0" spcFirstLastPara="1" vertOverflow="overflow" horzOverflow="overflow" vert="horz" wrap="square" lIns="45718" tIns="45718" rIns="45718" bIns="45718" numCol="1" spcCol="38100" rtlCol="0" anchor="t">
             <a:spAutoFit/>
           </a:bodyPr>
           <a:lstStyle/>
           <a:p>
-            <a:r>
-              <a:rPr lang="en-US" altLang="ko-KR">
-                <a:latin typeface="맑은 고딕 (제목)"/>
+            <a:pPr marL="0" marR="0" indent="0" algn="l" defTabSz="914400" rtl="0" fontAlgn="auto" latinLnBrk="0" hangingPunct="0">
+              <a:lnSpc>
+                <a:spcPct val="100000"/>
+              </a:lnSpc>
+              <a:spcBef>
+                <a:spcPts val="0"/>
+              </a:spcBef>
+              <a:spcAft>
+                <a:spcPts val="0"/>
+              </a:spcAft>
+              <a:buClrTx/>
+              <a:buSzTx/>
+              <a:buFontTx/>
+              <a:buNone/>
+              <a:tabLst/>
+            </a:pPr>
+            <a:r>
+              <a:rPr lang="en-US" altLang="ko-KR" sz="800" b="1" dirty="0">
+                <a:latin typeface="LINE Seed Sans KR Bold"/>
               </a:rPr>
-              <a:t>${Brands&gt;Types&gt;Items[0]["Item_</a:t>
-            </a:r>
-            <a:r>
-              <a:rPr lang="ko-KR" altLang="en-US">
-                <a:latin typeface="맑은 고딕 (제목)"/>
+              <a:t>Price</a:t>
+            </a:r>
+            <a:r>
+              <a:rPr lang="ko-KR" altLang="en-US" sz="800" b="1" dirty="0">
+                <a:latin typeface="LINE Seed Sans KR Bold"/>
               </a:rPr>
-              <a:t>캐릭터</a:t>
-            </a:r>
-            <a:r>
-              <a:rPr lang="en-US" altLang="ko-KR">
-                <a:latin typeface="맑은 고딕 (제목)"/>
-              </a:rPr>
-              <a:t>_</a:t>
-            </a:r>
-            <a:r>
-              <a:rPr lang="ko-KR" altLang="en-US">
-                <a:latin typeface="맑은 고딕 (제목)"/>
-              </a:rPr>
-              <a:t>세분류</a:t>
-            </a:r>
-            <a:r>
-              <a:rPr lang="en-US" altLang="ko-KR">
-                <a:latin typeface="맑은 고딕 (제목)"/>
-              </a:rPr>
-              <a:t>_</a:t>
-            </a:r>
-            <a:r>
-              <a:rPr lang="ko-KR" altLang="en-US">
-                <a:latin typeface="맑은 고딕 (제목)"/>
-              </a:rPr>
-              <a:t>명</a:t>
-            </a:r>
-            <a:r>
-              <a:rPr lang="en-US" altLang="ko-KR">
-                <a:latin typeface="맑은 고딕 (제목)"/>
-              </a:rPr>
-              <a:t>"]}</a:t>
-            </a:r>
+              <a:t> </a:t>
+            </a:r>
+            <a:endParaRPr kumimoji="0" lang="ko-KR" altLang="en-US" sz="800" b="1" i="0" u="none" strike="noStrike" cap="none" spc="0" normalizeH="0" baseline="0" dirty="0">
+              <a:ln>
+                <a:noFill/>
+              </a:ln>
+              <a:solidFill>
+                <a:srgbClr val="000000"/>
+              </a:solidFill>
+              <a:effectLst/>
+              <a:uFillTx/>
+              <a:latin typeface="LINE Seed Sans KR Bold"/>
+              <a:sym typeface="맑은 고딕"/>
+            </a:endParaRPr>
           </a:p>
         </p:txBody>
       </p:sp>
       <p:sp>
         <p:nvSpPr>
-          <p:cNvPr id="3" name="TextBox 2">
+          <p:cNvPr id="6" name="object 2">
             <a:extLst>
               <a:ext uri="{FF2B5EF4-FFF2-40B4-BE49-F238E27FC236}">
-                <a16:creationId xmlns:a16="http://schemas.microsoft.com/office/drawing/2014/main" id="{29E202B0-18A5-BE69-692E-8E4B1BCDBCDF}"/>
+                <a16:creationId xmlns:a16="http://schemas.microsoft.com/office/drawing/2014/main" id="{AEAF5BB0-0117-7BF0-B378-6A30E74A4C8D}"/>
+              </a:ext>
+            </a:extLst>
+          </p:cNvPr>
+          <p:cNvSpPr/>
+          <p:nvPr/>
+        </p:nvSpPr>
+        <p:spPr>
+          <a:xfrm flipV="1">
+            <a:off x="463551" y="4806555"/>
+            <a:ext cx="11340000" cy="18000"/>
+          </a:xfrm>
+          <a:custGeom>
+            <a:avLst/>
+            <a:gdLst/>
+            <a:ahLst/>
+            <a:cxnLst/>
+            <a:rect l="l" t="t" r="r" b="b"/>
+            <a:pathLst>
+              <a:path w="10332720" h="13970">
+                <a:moveTo>
+                  <a:pt x="10332720" y="0"/>
+                </a:moveTo>
+                <a:lnTo>
+                  <a:pt x="0" y="0"/>
+                </a:lnTo>
+                <a:lnTo>
+                  <a:pt x="0" y="13717"/>
+                </a:lnTo>
+                <a:lnTo>
+                  <a:pt x="10332720" y="13717"/>
+                </a:lnTo>
+                <a:lnTo>
+                  <a:pt x="10332720" y="0"/>
+                </a:lnTo>
+                <a:close/>
+              </a:path>
+            </a:pathLst>
+          </a:custGeom>
+          <a:solidFill>
+            <a:srgbClr val="000000"/>
+          </a:solidFill>
+        </p:spPr>
+        <p:txBody>
+          <a:bodyPr wrap="square" lIns="0" tIns="0" rIns="0" bIns="0" rtlCol="0"/>
+          <a:lstStyle/>
+          <a:p>
+            <a:endParaRPr sz="1632">
+              <a:latin typeface="LINE Seed Sans KR Bold"/>
+            </a:endParaRPr>
+          </a:p>
+        </p:txBody>
+      </p:sp>
+      <p:sp>
+        <p:nvSpPr>
+          <p:cNvPr id="7" name="TextBox 6">
+            <a:extLst>
+              <a:ext uri="{FF2B5EF4-FFF2-40B4-BE49-F238E27FC236}">
+                <a16:creationId xmlns:a16="http://schemas.microsoft.com/office/drawing/2014/main" id="{17E0448B-F19D-95B5-9AF8-6C5156DFED76}"/>
+              </a:ext>
+              <a:ext uri="{C183D7F6-B498-43B3-948B-1728B52AA6E4}">
+                <adec:decorative xmlns:adec="http://schemas.microsoft.com/office/drawing/2017/decorative" val="0"/>
               </a:ext>
             </a:extLst>
           </p:cNvPr>
@@ -6269,8 +6822,8 @@
         </p:nvSpPr>
         <p:spPr>
           <a:xfrm>
-            <a:off x="2513259" y="1903429"/>
-            <a:ext cx="6494251" cy="369332"/>
+            <a:off x="280662" y="4868185"/>
+            <a:ext cx="1272798" cy="200051"/>
           </a:xfrm>
           <a:prstGeom prst="rect">
             <a:avLst/>
@@ -6296,62 +6849,89 @@
           <a:fontRef idx="none"/>
         </p:style>
         <p:txBody>
-          <a:bodyPr wrap="square">
+          <a:bodyPr rot="0" spcFirstLastPara="1" vertOverflow="overflow" horzOverflow="overflow" vert="horz" wrap="square" lIns="45718" tIns="45718" rIns="45718" bIns="45718" numCol="1" spcCol="38100" rtlCol="0" anchor="t">
             <a:spAutoFit/>
           </a:bodyPr>
           <a:lstStyle/>
           <a:p>
-            <a:r>
-              <a:rPr lang="en-US" altLang="ko-KR">
-                <a:latin typeface="맑은 고딕 (제목)"/>
+            <a:pPr lvl="1" algn="r"/>
+            <a:r>
+              <a:rPr kumimoji="0" lang="en-US" altLang="ko-KR" sz="700" b="0" i="0" u="none" strike="noStrike" cap="none" spc="0" normalizeH="0" baseline="0">
+                <a:ln>
+                  <a:noFill/>
+                </a:ln>
+                <a:solidFill>
+                  <a:srgbClr val="000000"/>
+                </a:solidFill>
+                <a:effectLst/>
+                <a:uFillTx/>
+                <a:latin typeface="+mn-lt"/>
+                <a:ea typeface="+mj-ea"/>
+                <a:cs typeface="+mj-cs"/>
+                <a:sym typeface="맑은 고딕"/>
               </a:rPr>
-              <a:t>${Brands&gt;Types&gt;Items[1]["Item_</a:t>
-            </a:r>
-            <a:r>
-              <a:rPr lang="ko-KR" altLang="en-US">
-                <a:latin typeface="맑은 고딕 (제목)"/>
+              <a:t>${Items[0]["Cost_</a:t>
+            </a:r>
+            <a:r>
+              <a:rPr kumimoji="0" lang="ko-KR" altLang="en-US" sz="700" b="0" i="0" u="none" strike="noStrike" cap="none" spc="0" normalizeH="0" baseline="0">
+                <a:ln>
+                  <a:noFill/>
+                </a:ln>
+                <a:solidFill>
+                  <a:srgbClr val="000000"/>
+                </a:solidFill>
+                <a:effectLst/>
+                <a:uFillTx/>
+                <a:latin typeface="+mn-lt"/>
+                <a:ea typeface="+mj-ea"/>
+                <a:cs typeface="+mj-cs"/>
+                <a:sym typeface="맑은 고딕"/>
               </a:rPr>
-              <a:t>캐릭터</a:t>
-            </a:r>
-            <a:r>
-              <a:rPr lang="en-US" altLang="ko-KR">
-                <a:latin typeface="맑은 고딕 (제목)"/>
-              </a:rPr>
-              <a:t>_</a:t>
-            </a:r>
-            <a:r>
-              <a:rPr lang="ko-KR" altLang="en-US">
-                <a:latin typeface="맑은 고딕 (제목)"/>
-              </a:rPr>
-              <a:t>세분류</a:t>
-            </a:r>
-            <a:r>
-              <a:rPr lang="en-US" altLang="ko-KR">
-                <a:latin typeface="맑은 고딕 (제목)"/>
-              </a:rPr>
-              <a:t>_</a:t>
-            </a:r>
-            <a:r>
-              <a:rPr lang="ko-KR" altLang="en-US">
-                <a:latin typeface="맑은 고딕 (제목)"/>
-              </a:rPr>
-              <a:t>명</a:t>
-            </a:r>
-            <a:r>
-              <a:rPr lang="en-US" altLang="ko-KR">
-                <a:latin typeface="맑은 고딕 (제목)"/>
+              <a:t>통화</a:t>
+            </a:r>
+            <a:r>
+              <a:rPr kumimoji="0" lang="en-US" altLang="ko-KR" sz="700" b="0" i="0" u="none" strike="noStrike" cap="none" spc="0" normalizeH="0" baseline="0">
+                <a:ln>
+                  <a:noFill/>
+                </a:ln>
+                <a:solidFill>
+                  <a:srgbClr val="000000"/>
+                </a:solidFill>
+                <a:effectLst/>
+                <a:uFillTx/>
+                <a:latin typeface="+mn-lt"/>
+                <a:ea typeface="+mj-ea"/>
+                <a:cs typeface="+mj-cs"/>
+                <a:sym typeface="맑은 고딕"/>
               </a:rPr>
               <a:t>"]}</a:t>
             </a:r>
+            <a:endParaRPr kumimoji="0" lang="ko-KR" altLang="en-US" sz="700" b="0" i="0" u="none" strike="noStrike" cap="none" spc="0" normalizeH="0" baseline="0">
+              <a:ln>
+                <a:noFill/>
+              </a:ln>
+              <a:solidFill>
+                <a:srgbClr val="000000"/>
+              </a:solidFill>
+              <a:effectLst/>
+              <a:uFillTx/>
+              <a:latin typeface="+mn-lt"/>
+              <a:ea typeface="+mj-ea"/>
+              <a:cs typeface="+mj-cs"/>
+              <a:sym typeface="맑은 고딕"/>
+            </a:endParaRPr>
           </a:p>
         </p:txBody>
       </p:sp>
       <p:sp>
         <p:nvSpPr>
-          <p:cNvPr id="4" name="TextBox 3">
+          <p:cNvPr id="8" name="TextBox 7">
             <a:extLst>
               <a:ext uri="{FF2B5EF4-FFF2-40B4-BE49-F238E27FC236}">
-                <a16:creationId xmlns:a16="http://schemas.microsoft.com/office/drawing/2014/main" id="{1AC8144E-D331-60AF-2124-425093553F42}"/>
+                <a16:creationId xmlns:a16="http://schemas.microsoft.com/office/drawing/2014/main" id="{ECF8EB8A-0666-A733-29C1-FE517D21659C}"/>
+              </a:ext>
+              <a:ext uri="{C183D7F6-B498-43B3-948B-1728B52AA6E4}">
+                <adec:decorative xmlns:adec="http://schemas.microsoft.com/office/drawing/2017/decorative" val="0"/>
               </a:ext>
             </a:extLst>
           </p:cNvPr>
@@ -6360,8 +6940,8 @@
         </p:nvSpPr>
         <p:spPr>
           <a:xfrm>
-            <a:off x="2513259" y="2265400"/>
-            <a:ext cx="6494251" cy="369332"/>
+            <a:off x="280662" y="5061243"/>
+            <a:ext cx="1272798" cy="200051"/>
           </a:xfrm>
           <a:prstGeom prst="rect">
             <a:avLst/>
@@ -6387,53 +6967,441 @@
           <a:fontRef idx="none"/>
         </p:style>
         <p:txBody>
-          <a:bodyPr wrap="square">
+          <a:bodyPr rot="0" spcFirstLastPara="1" vertOverflow="overflow" horzOverflow="overflow" vert="horz" wrap="square" lIns="45718" tIns="45718" rIns="45718" bIns="45718" numCol="1" spcCol="38100" rtlCol="0" anchor="t">
             <a:spAutoFit/>
           </a:bodyPr>
           <a:lstStyle/>
           <a:p>
-            <a:r>
-              <a:rPr lang="en-US" altLang="ko-KR">
-                <a:latin typeface="맑은 고딕 (제목)"/>
+            <a:pPr lvl="1" algn="r"/>
+            <a:r>
+              <a:rPr kumimoji="0" lang="en-US" altLang="ko-KR" sz="700" b="0" i="0" u="none" strike="noStrike" cap="none" spc="0" normalizeH="0" baseline="0">
+                <a:ln>
+                  <a:noFill/>
+                </a:ln>
+                <a:solidFill>
+                  <a:srgbClr val="000000"/>
+                </a:solidFill>
+                <a:effectLst/>
+                <a:uFillTx/>
+                <a:latin typeface="+mn-lt"/>
+                <a:ea typeface="+mj-ea"/>
+                <a:cs typeface="+mj-cs"/>
+                <a:sym typeface="맑은 고딕"/>
               </a:rPr>
-              <a:t>${Brands&gt;Types&gt;Items[2]["Item_</a:t>
-            </a:r>
-            <a:r>
-              <a:rPr lang="ko-KR" altLang="en-US">
-                <a:latin typeface="맑은 고딕 (제목)"/>
+              <a:t>${Items[1]["Cost_</a:t>
+            </a:r>
+            <a:r>
+              <a:rPr kumimoji="0" lang="ko-KR" altLang="en-US" sz="700" b="0" i="0" u="none" strike="noStrike" cap="none" spc="0" normalizeH="0" baseline="0">
+                <a:ln>
+                  <a:noFill/>
+                </a:ln>
+                <a:solidFill>
+                  <a:srgbClr val="000000"/>
+                </a:solidFill>
+                <a:effectLst/>
+                <a:uFillTx/>
+                <a:latin typeface="+mn-lt"/>
+                <a:ea typeface="+mj-ea"/>
+                <a:cs typeface="+mj-cs"/>
+                <a:sym typeface="맑은 고딕"/>
               </a:rPr>
-              <a:t>캐릭터</a:t>
-            </a:r>
-            <a:r>
-              <a:rPr lang="en-US" altLang="ko-KR">
-                <a:latin typeface="맑은 고딕 (제목)"/>
-              </a:rPr>
-              <a:t>_</a:t>
-            </a:r>
-            <a:r>
-              <a:rPr lang="ko-KR" altLang="en-US">
-                <a:latin typeface="맑은 고딕 (제목)"/>
-              </a:rPr>
-              <a:t>세분류</a:t>
-            </a:r>
-            <a:r>
-              <a:rPr lang="en-US" altLang="ko-KR">
-                <a:latin typeface="맑은 고딕 (제목)"/>
-              </a:rPr>
-              <a:t>_</a:t>
-            </a:r>
-            <a:r>
-              <a:rPr lang="ko-KR" altLang="en-US">
-                <a:latin typeface="맑은 고딕 (제목)"/>
-              </a:rPr>
-              <a:t>명</a:t>
-            </a:r>
-            <a:r>
-              <a:rPr lang="en-US" altLang="ko-KR">
-                <a:latin typeface="맑은 고딕 (제목)"/>
+              <a:t>통화</a:t>
+            </a:r>
+            <a:r>
+              <a:rPr kumimoji="0" lang="en-US" altLang="ko-KR" sz="700" b="0" i="0" u="none" strike="noStrike" cap="none" spc="0" normalizeH="0" baseline="0">
+                <a:ln>
+                  <a:noFill/>
+                </a:ln>
+                <a:solidFill>
+                  <a:srgbClr val="000000"/>
+                </a:solidFill>
+                <a:effectLst/>
+                <a:uFillTx/>
+                <a:latin typeface="+mn-lt"/>
+                <a:ea typeface="+mj-ea"/>
+                <a:cs typeface="+mj-cs"/>
+                <a:sym typeface="맑은 고딕"/>
               </a:rPr>
               <a:t>"]}</a:t>
             </a:r>
+            <a:endParaRPr kumimoji="0" lang="ko-KR" altLang="en-US" sz="700" b="0" i="0" u="none" strike="noStrike" cap="none" spc="0" normalizeH="0" baseline="0">
+              <a:ln>
+                <a:noFill/>
+              </a:ln>
+              <a:solidFill>
+                <a:srgbClr val="000000"/>
+              </a:solidFill>
+              <a:effectLst/>
+              <a:uFillTx/>
+              <a:latin typeface="+mn-lt"/>
+              <a:ea typeface="+mj-ea"/>
+              <a:cs typeface="+mj-cs"/>
+              <a:sym typeface="맑은 고딕"/>
+            </a:endParaRPr>
+          </a:p>
+        </p:txBody>
+      </p:sp>
+      <p:sp>
+        <p:nvSpPr>
+          <p:cNvPr id="9" name="TextBox 8">
+            <a:extLst>
+              <a:ext uri="{FF2B5EF4-FFF2-40B4-BE49-F238E27FC236}">
+                <a16:creationId xmlns:a16="http://schemas.microsoft.com/office/drawing/2014/main" id="{E257603B-2A9F-1EC4-5BE8-106E23FA0B76}"/>
+              </a:ext>
+              <a:ext uri="{C183D7F6-B498-43B3-948B-1728B52AA6E4}">
+                <adec:decorative xmlns:adec="http://schemas.microsoft.com/office/drawing/2017/decorative" val="0"/>
+              </a:ext>
+            </a:extLst>
+          </p:cNvPr>
+          <p:cNvSpPr txBox="1"/>
+          <p:nvPr/>
+        </p:nvSpPr>
+        <p:spPr>
+          <a:xfrm>
+            <a:off x="280662" y="5254301"/>
+            <a:ext cx="1272798" cy="200051"/>
+          </a:xfrm>
+          <a:prstGeom prst="rect">
+            <a:avLst/>
+          </a:prstGeom>
+          <a:noFill/>
+          <a:ln w="12700" cap="flat">
+            <a:noFill/>
+            <a:miter lim="400000"/>
+          </a:ln>
+          <a:effectLst/>
+          <a:sp3d/>
+        </p:spPr>
+        <p:style>
+          <a:lnRef idx="0">
+            <a:scrgbClr r="0" g="0" b="0"/>
+          </a:lnRef>
+          <a:fillRef idx="0">
+            <a:scrgbClr r="0" g="0" b="0"/>
+          </a:fillRef>
+          <a:effectRef idx="0">
+            <a:scrgbClr r="0" g="0" b="0"/>
+          </a:effectRef>
+          <a:fontRef idx="none"/>
+        </p:style>
+        <p:txBody>
+          <a:bodyPr rot="0" spcFirstLastPara="1" vertOverflow="overflow" horzOverflow="overflow" vert="horz" wrap="square" lIns="45718" tIns="45718" rIns="45718" bIns="45718" numCol="1" spcCol="38100" rtlCol="0" anchor="t">
+            <a:spAutoFit/>
+          </a:bodyPr>
+          <a:lstStyle/>
+          <a:p>
+            <a:pPr lvl="1" algn="r"/>
+            <a:r>
+              <a:rPr kumimoji="0" lang="en-US" altLang="ko-KR" sz="700" b="0" i="0" u="none" strike="noStrike" cap="none" spc="0" normalizeH="0" baseline="0">
+                <a:ln>
+                  <a:noFill/>
+                </a:ln>
+                <a:solidFill>
+                  <a:srgbClr val="000000"/>
+                </a:solidFill>
+                <a:effectLst/>
+                <a:uFillTx/>
+                <a:latin typeface="+mn-lt"/>
+                <a:ea typeface="+mj-ea"/>
+                <a:cs typeface="+mj-cs"/>
+                <a:sym typeface="맑은 고딕"/>
+              </a:rPr>
+              <a:t>${Items[2]["Cost_</a:t>
+            </a:r>
+            <a:r>
+              <a:rPr kumimoji="0" lang="ko-KR" altLang="en-US" sz="700" b="0" i="0" u="none" strike="noStrike" cap="none" spc="0" normalizeH="0" baseline="0">
+                <a:ln>
+                  <a:noFill/>
+                </a:ln>
+                <a:solidFill>
+                  <a:srgbClr val="000000"/>
+                </a:solidFill>
+                <a:effectLst/>
+                <a:uFillTx/>
+                <a:latin typeface="+mn-lt"/>
+                <a:ea typeface="+mj-ea"/>
+                <a:cs typeface="+mj-cs"/>
+                <a:sym typeface="맑은 고딕"/>
+              </a:rPr>
+              <a:t>통화</a:t>
+            </a:r>
+            <a:r>
+              <a:rPr kumimoji="0" lang="en-US" altLang="ko-KR" sz="700" b="0" i="0" u="none" strike="noStrike" cap="none" spc="0" normalizeH="0" baseline="0">
+                <a:ln>
+                  <a:noFill/>
+                </a:ln>
+                <a:solidFill>
+                  <a:srgbClr val="000000"/>
+                </a:solidFill>
+                <a:effectLst/>
+                <a:uFillTx/>
+                <a:latin typeface="+mn-lt"/>
+                <a:ea typeface="+mj-ea"/>
+                <a:cs typeface="+mj-cs"/>
+                <a:sym typeface="맑은 고딕"/>
+              </a:rPr>
+              <a:t>"]}</a:t>
+            </a:r>
+            <a:endParaRPr kumimoji="0" lang="ko-KR" altLang="en-US" sz="700" b="0" i="0" u="none" strike="noStrike" cap="none" spc="0" normalizeH="0" baseline="0">
+              <a:ln>
+                <a:noFill/>
+              </a:ln>
+              <a:solidFill>
+                <a:srgbClr val="000000"/>
+              </a:solidFill>
+              <a:effectLst/>
+              <a:uFillTx/>
+              <a:latin typeface="+mn-lt"/>
+              <a:ea typeface="+mj-ea"/>
+              <a:cs typeface="+mj-cs"/>
+              <a:sym typeface="맑은 고딕"/>
+            </a:endParaRPr>
+          </a:p>
+        </p:txBody>
+      </p:sp>
+      <p:sp>
+        <p:nvSpPr>
+          <p:cNvPr id="3" name="직사각형 2">
+            <a:extLst>
+              <a:ext uri="{FF2B5EF4-FFF2-40B4-BE49-F238E27FC236}">
+                <a16:creationId xmlns:a16="http://schemas.microsoft.com/office/drawing/2014/main" id="{771F0DA8-60AB-94D5-0EBA-9E8378E6072A}"/>
+              </a:ext>
+            </a:extLst>
+          </p:cNvPr>
+          <p:cNvSpPr/>
+          <p:nvPr/>
+        </p:nvSpPr>
+        <p:spPr>
+          <a:xfrm>
+            <a:off x="852824" y="836422"/>
+            <a:ext cx="1727456" cy="1754322"/>
+          </a:xfrm>
+          <a:prstGeom prst="rect">
+            <a:avLst/>
+          </a:prstGeom>
+          <a:solidFill>
+            <a:srgbClr val="FFFFFF"/>
+          </a:solidFill>
+          <a:ln w="25400" cap="flat">
+            <a:solidFill>
+              <a:schemeClr val="accent1"/>
+            </a:solidFill>
+            <a:prstDash val="solid"/>
+            <a:round/>
+          </a:ln>
+          <a:effectLst/>
+          <a:sp3d/>
+        </p:spPr>
+        <p:style>
+          <a:lnRef idx="0">
+            <a:scrgbClr r="0" g="0" b="0"/>
+          </a:lnRef>
+          <a:fillRef idx="0">
+            <a:scrgbClr r="0" g="0" b="0"/>
+          </a:fillRef>
+          <a:effectRef idx="0">
+            <a:scrgbClr r="0" g="0" b="0"/>
+          </a:effectRef>
+          <a:fontRef idx="none"/>
+        </p:style>
+        <p:txBody>
+          <a:bodyPr rot="0" spcFirstLastPara="1" vertOverflow="overflow" horzOverflow="overflow" vert="horz" wrap="square" lIns="45718" tIns="45718" rIns="45718" bIns="45718" numCol="1" spcCol="38100" rtlCol="0" anchor="ctr">
+            <a:noAutofit/>
+          </a:bodyPr>
+          <a:lstStyle/>
+          <a:p>
+            <a:pPr lvl="1"/>
+            <a:r>
+              <a:rPr kumimoji="0" lang="en-US" altLang="ko-KR" sz="900" b="0" i="0" u="none" strike="noStrike" cap="none" spc="0" normalizeH="0" baseline="0">
+                <a:ln>
+                  <a:noFill/>
+                </a:ln>
+                <a:solidFill>
+                  <a:srgbClr val="000000"/>
+                </a:solidFill>
+                <a:effectLst/>
+                <a:uFillTx/>
+                <a:latin typeface="LINE Seed Sans KR Bold"/>
+                <a:sym typeface="맑은 고딕"/>
+              </a:rPr>
+              <a:t>${ppt.Image(Items[0]["Image_Image_Src"])}</a:t>
+            </a:r>
+            <a:endParaRPr kumimoji="0" lang="ko-KR" altLang="en-US" sz="900" b="0" i="0" u="none" strike="noStrike" cap="none" spc="0" normalizeH="0" baseline="0" dirty="0">
+              <a:ln>
+                <a:noFill/>
+              </a:ln>
+              <a:solidFill>
+                <a:srgbClr val="000000"/>
+              </a:solidFill>
+              <a:effectLst/>
+              <a:uFillTx/>
+              <a:latin typeface="LINE Seed Sans KR Bold"/>
+              <a:sym typeface="맑은 고딕"/>
+            </a:endParaRPr>
+          </a:p>
+        </p:txBody>
+      </p:sp>
+      <p:sp>
+        <p:nvSpPr>
+          <p:cNvPr id="4" name="직사각형 3">
+            <a:extLst>
+              <a:ext uri="{FF2B5EF4-FFF2-40B4-BE49-F238E27FC236}">
+                <a16:creationId xmlns:a16="http://schemas.microsoft.com/office/drawing/2014/main" id="{3E09EE98-E906-7E0E-41D4-7084CB9FB771}"/>
+              </a:ext>
+            </a:extLst>
+          </p:cNvPr>
+          <p:cNvSpPr/>
+          <p:nvPr/>
+        </p:nvSpPr>
+        <p:spPr>
+          <a:xfrm>
+            <a:off x="2682940" y="836422"/>
+            <a:ext cx="1727456" cy="1754322"/>
+          </a:xfrm>
+          <a:prstGeom prst="rect">
+            <a:avLst/>
+          </a:prstGeom>
+          <a:solidFill>
+            <a:srgbClr val="FFFFFF"/>
+          </a:solidFill>
+          <a:ln w="25400" cap="flat">
+            <a:solidFill>
+              <a:schemeClr val="accent1"/>
+            </a:solidFill>
+            <a:prstDash val="solid"/>
+            <a:round/>
+          </a:ln>
+          <a:effectLst/>
+          <a:sp3d/>
+        </p:spPr>
+        <p:style>
+          <a:lnRef idx="0">
+            <a:scrgbClr r="0" g="0" b="0"/>
+          </a:lnRef>
+          <a:fillRef idx="0">
+            <a:scrgbClr r="0" g="0" b="0"/>
+          </a:fillRef>
+          <a:effectRef idx="0">
+            <a:scrgbClr r="0" g="0" b="0"/>
+          </a:effectRef>
+          <a:fontRef idx="none"/>
+        </p:style>
+        <p:txBody>
+          <a:bodyPr rot="0" spcFirstLastPara="1" vertOverflow="overflow" horzOverflow="overflow" vert="horz" wrap="square" lIns="45718" tIns="45718" rIns="45718" bIns="45718" numCol="1" spcCol="38100" rtlCol="0" anchor="ctr">
+            <a:noAutofit/>
+          </a:bodyPr>
+          <a:lstStyle/>
+          <a:p>
+            <a:pPr lvl="1"/>
+            <a:r>
+              <a:rPr kumimoji="0" lang="en-US" altLang="ko-KR" sz="900" b="0" i="0" u="none" strike="noStrike" cap="none" spc="0" normalizeH="0" baseline="0">
+                <a:ln>
+                  <a:noFill/>
+                </a:ln>
+                <a:solidFill>
+                  <a:srgbClr val="000000"/>
+                </a:solidFill>
+                <a:effectLst/>
+                <a:uFillTx/>
+                <a:latin typeface="LINE Seed Sans KR Bold"/>
+                <a:sym typeface="맑은 고딕"/>
+              </a:rPr>
+              <a:t>${ppt.Image(Items[1]["Image_Image_Src"])}</a:t>
+            </a:r>
+            <a:endParaRPr kumimoji="0" lang="ko-KR" altLang="en-US" sz="900" b="0" i="0" u="none" strike="noStrike" cap="none" spc="0" normalizeH="0" baseline="0" dirty="0">
+              <a:ln>
+                <a:noFill/>
+              </a:ln>
+              <a:solidFill>
+                <a:srgbClr val="000000"/>
+              </a:solidFill>
+              <a:effectLst/>
+              <a:uFillTx/>
+              <a:latin typeface="LINE Seed Sans KR Bold"/>
+              <a:sym typeface="맑은 고딕"/>
+            </a:endParaRPr>
+          </a:p>
+        </p:txBody>
+      </p:sp>
+      <p:sp>
+        <p:nvSpPr>
+          <p:cNvPr id="18" name="직사각형 17">
+            <a:extLst>
+              <a:ext uri="{FF2B5EF4-FFF2-40B4-BE49-F238E27FC236}">
+                <a16:creationId xmlns:a16="http://schemas.microsoft.com/office/drawing/2014/main" id="{834E604F-59DC-7124-5ED0-8DFED91C7A35}"/>
+              </a:ext>
+            </a:extLst>
+          </p:cNvPr>
+          <p:cNvSpPr/>
+          <p:nvPr/>
+        </p:nvSpPr>
+        <p:spPr>
+          <a:xfrm>
+            <a:off x="4513056" y="836422"/>
+            <a:ext cx="1727456" cy="1754322"/>
+          </a:xfrm>
+          <a:prstGeom prst="rect">
+            <a:avLst/>
+          </a:prstGeom>
+          <a:solidFill>
+            <a:srgbClr val="FFFFFF"/>
+          </a:solidFill>
+          <a:ln w="25400" cap="flat">
+            <a:solidFill>
+              <a:schemeClr val="accent1"/>
+            </a:solidFill>
+            <a:prstDash val="solid"/>
+            <a:round/>
+          </a:ln>
+          <a:effectLst/>
+          <a:sp3d/>
+        </p:spPr>
+        <p:style>
+          <a:lnRef idx="0">
+            <a:scrgbClr r="0" g="0" b="0"/>
+          </a:lnRef>
+          <a:fillRef idx="0">
+            <a:scrgbClr r="0" g="0" b="0"/>
+          </a:fillRef>
+          <a:effectRef idx="0">
+            <a:scrgbClr r="0" g="0" b="0"/>
+          </a:effectRef>
+          <a:fontRef idx="none"/>
+        </p:style>
+        <p:txBody>
+          <a:bodyPr rot="0" spcFirstLastPara="1" vertOverflow="overflow" horzOverflow="overflow" vert="horz" wrap="square" lIns="45718" tIns="45718" rIns="45718" bIns="45718" numCol="1" spcCol="38100" rtlCol="0" anchor="ctr">
+            <a:noAutofit/>
+          </a:bodyPr>
+          <a:lstStyle/>
+          <a:p>
+            <a:pPr lvl="1"/>
+            <a:r>
+              <a:rPr kumimoji="0" lang="en-US" altLang="ko-KR" sz="900" b="0" i="0" u="none" strike="noStrike" cap="none" spc="0" normalizeH="0" baseline="0">
+                <a:ln>
+                  <a:noFill/>
+                </a:ln>
+                <a:solidFill>
+                  <a:srgbClr val="000000"/>
+                </a:solidFill>
+                <a:effectLst/>
+                <a:uFillTx/>
+                <a:latin typeface="LINE Seed Sans KR Bold"/>
+                <a:sym typeface="맑은 고딕"/>
+              </a:rPr>
+              <a:t>${ppt.Image(Items[2]["Image_Image_Src"])}</a:t>
+            </a:r>
+            <a:endParaRPr kumimoji="0" lang="ko-KR" altLang="en-US" sz="900" b="0" i="0" u="none" strike="noStrike" cap="none" spc="0" normalizeH="0" baseline="0" dirty="0">
+              <a:ln>
+                <a:noFill/>
+              </a:ln>
+              <a:solidFill>
+                <a:srgbClr val="000000"/>
+              </a:solidFill>
+              <a:effectLst/>
+              <a:uFillTx/>
+              <a:latin typeface="LINE Seed Sans KR Bold"/>
+              <a:sym typeface="맑은 고딕"/>
+            </a:endParaRPr>
           </a:p>
         </p:txBody>
       </p:sp>
@@ -6489,7 +7457,7 @@
           </a:ln>
           <a:extLst>
             <a:ext uri="{C572A759-6A51-4108-AA02-DFA0A04FC94B}">
-              <ma14:wrappingTextBoxFlag xmlns:ma14="http://schemas.microsoft.com/office/mac/drawingml/2011/main" xmlns:a14="http://schemas.microsoft.com/office/drawing/2010/main" xmlns:m="http://schemas.openxmlformats.org/officeDocument/2006/math" xmlns="" val="1"/>
+              <ma14:wrappingTextBoxFlag xmlns="" xmlns:m="http://schemas.openxmlformats.org/officeDocument/2006/math" xmlns:a14="http://schemas.microsoft.com/office/drawing/2010/main" xmlns:ma14="http://schemas.microsoft.com/office/mac/drawingml/2011/main" val="1"/>
             </a:ext>
           </a:extLst>
         </p:spPr>
@@ -8743,14 +9711,12 @@
 </file>
 
 <file path=customXml/item1.xml><?xml version="1.0" encoding="utf-8"?>
-<p:properties xmlns:p="http://schemas.microsoft.com/office/2006/metadata/properties" xmlns:xsi="http://www.w3.org/2001/XMLSchema-instance" xmlns:pc="http://schemas.microsoft.com/office/infopath/2007/PartnerControls">
-  <documentManagement>
-    <TaxCatchAll xmlns="0ecacd0f-83e0-492f-bd4a-5a9e7a35ff9c" xsi:nil="true"/>
-    <lcf76f155ced4ddcb4097134ff3c332f xmlns="b9329f95-2df8-4c55-a92f-394dba339443">
-      <Terms xmlns="http://schemas.microsoft.com/office/infopath/2007/PartnerControls"/>
-    </lcf76f155ced4ddcb4097134ff3c332f>
-  </documentManagement>
-</p:properties>
+<?mso-contentType ?>
+<FormTemplates xmlns="http://schemas.microsoft.com/sharepoint/v3/contenttype/forms">
+  <Display>DocumentLibraryForm</Display>
+  <Edit>DocumentLibraryForm</Edit>
+  <New>DocumentLibraryForm</New>
+</FormTemplates>
 </file>
 
 <file path=customXml/item2.xml><?xml version="1.0" encoding="utf-8"?>
@@ -8995,21 +9961,20 @@
 </file>
 
 <file path=customXml/item3.xml><?xml version="1.0" encoding="utf-8"?>
-<?mso-contentType ?>
-<FormTemplates xmlns="http://schemas.microsoft.com/sharepoint/v3/contenttype/forms">
-  <Display>DocumentLibraryForm</Display>
-  <Edit>DocumentLibraryForm</Edit>
-  <New>DocumentLibraryForm</New>
-</FormTemplates>
+<p:properties xmlns:p="http://schemas.microsoft.com/office/2006/metadata/properties" xmlns:xsi="http://www.w3.org/2001/XMLSchema-instance" xmlns:pc="http://schemas.microsoft.com/office/infopath/2007/PartnerControls">
+  <documentManagement>
+    <TaxCatchAll xmlns="0ecacd0f-83e0-492f-bd4a-5a9e7a35ff9c" xsi:nil="true"/>
+    <lcf76f155ced4ddcb4097134ff3c332f xmlns="b9329f95-2df8-4c55-a92f-394dba339443">
+      <Terms xmlns="http://schemas.microsoft.com/office/infopath/2007/PartnerControls"/>
+    </lcf76f155ced4ddcb4097134ff3c332f>
+  </documentManagement>
+</p:properties>
 </file>
 
 <file path=customXml/itemProps1.xml><?xml version="1.0" encoding="utf-8"?>
-<ds:datastoreItem xmlns:ds="http://schemas.openxmlformats.org/officeDocument/2006/customXml" ds:itemID="{6DF45D6B-9CD7-4CD6-93CC-F49636405F02}">
+<ds:datastoreItem xmlns:ds="http://schemas.openxmlformats.org/officeDocument/2006/customXml" ds:itemID="{BFDA123D-8DD5-4A37-8415-071CF94EC202}">
   <ds:schemaRefs>
-    <ds:schemaRef ds:uri="http://schemas.microsoft.com/office/2006/metadata/properties"/>
-    <ds:schemaRef ds:uri="http://schemas.microsoft.com/office/infopath/2007/PartnerControls"/>
-    <ds:schemaRef ds:uri="0ecacd0f-83e0-492f-bd4a-5a9e7a35ff9c"/>
-    <ds:schemaRef ds:uri="b9329f95-2df8-4c55-a92f-394dba339443"/>
+    <ds:schemaRef ds:uri="http://schemas.microsoft.com/sharepoint/v3/contenttype/forms"/>
   </ds:schemaRefs>
 </ds:datastoreItem>
 </file>
@@ -9034,9 +9999,12 @@
 </file>
 
 <file path=customXml/itemProps3.xml><?xml version="1.0" encoding="utf-8"?>
-<ds:datastoreItem xmlns:ds="http://schemas.openxmlformats.org/officeDocument/2006/customXml" ds:itemID="{BFDA123D-8DD5-4A37-8415-071CF94EC202}">
+<ds:datastoreItem xmlns:ds="http://schemas.openxmlformats.org/officeDocument/2006/customXml" ds:itemID="{6DF45D6B-9CD7-4CD6-93CC-F49636405F02}">
   <ds:schemaRefs>
-    <ds:schemaRef ds:uri="http://schemas.microsoft.com/sharepoint/v3/contenttype/forms"/>
+    <ds:schemaRef ds:uri="http://schemas.microsoft.com/office/2006/metadata/properties"/>
+    <ds:schemaRef ds:uri="http://schemas.microsoft.com/office/infopath/2007/PartnerControls"/>
+    <ds:schemaRef ds:uri="0ecacd0f-83e0-492f-bd4a-5a9e7a35ff9c"/>
+    <ds:schemaRef ds:uri="b9329f95-2df8-4c55-a92f-394dba339443"/>
   </ds:schemaRefs>
 </ds:datastoreItem>
 </file>
</xml_diff>